<commit_message>
finish poster cnn part
</commit_message>
<xml_diff>
--- a/Poster.pptx
+++ b/Poster.pptx
@@ -217,7 +217,7 @@
           <a:p>
             <a:fld id="{EC5DAD25-F83A-E84F-8A45-00F8F1023B42}" type="datetimeFigureOut">
               <a:rPr lang="en-US" smtClean="0"/>
-              <a:t>5/28/2018</a:t>
+              <a:t>5/28/18</a:t>
             </a:fld>
             <a:endParaRPr lang="en-US"/>
           </a:p>
@@ -909,6 +909,1119 @@
           <a:chExt cx="0" cy="0"/>
         </a:xfrm>
       </p:grpSpPr>
+      <p:pic>
+        <p:nvPicPr>
+          <p:cNvPr id="11" name="Picture 10">
+            <a:extLst>
+              <a:ext uri="{FF2B5EF4-FFF2-40B4-BE49-F238E27FC236}">
+                <a16:creationId xmlns:a16="http://schemas.microsoft.com/office/drawing/2014/main" id="{0FD94D94-BA53-E249-B0AE-C6BFD8171E18}"/>
+              </a:ext>
+            </a:extLst>
+          </p:cNvPr>
+          <p:cNvPicPr>
+            <a:picLocks noChangeAspect="1"/>
+          </p:cNvPicPr>
+          <p:nvPr/>
+        </p:nvPicPr>
+        <p:blipFill>
+          <a:blip r:embed="rId3"/>
+          <a:stretch>
+            <a:fillRect/>
+          </a:stretch>
+        </p:blipFill>
+        <p:spPr>
+          <a:xfrm>
+            <a:off x="12324214" y="8931377"/>
+            <a:ext cx="4211223" cy="2405648"/>
+          </a:xfrm>
+          <a:prstGeom prst="rect">
+            <a:avLst/>
+          </a:prstGeom>
+        </p:spPr>
+      </p:pic>
+      <p:sp>
+        <p:nvSpPr>
+          <p:cNvPr id="7" name="TextBox 6"/>
+          <p:cNvSpPr txBox="1"/>
+          <p:nvPr/>
+        </p:nvSpPr>
+        <p:spPr>
+          <a:xfrm>
+            <a:off x="11734484" y="5073412"/>
+            <a:ext cx="9326880" cy="11998079"/>
+          </a:xfrm>
+          <a:prstGeom prst="rect">
+            <a:avLst/>
+          </a:prstGeom>
+          <a:noFill/>
+        </p:spPr>
+        <p:txBody>
+          <a:bodyPr wrap="square" lIns="65837" tIns="32918" rIns="65837" bIns="32918" rtlCol="0">
+            <a:spAutoFit/>
+          </a:bodyPr>
+          <a:lstStyle/>
+          <a:p>
+            <a:r>
+              <a:rPr lang="en-US" altLang="zh-Hans" sz="4320" b="1" dirty="0">
+                <a:solidFill>
+                  <a:srgbClr val="2D669D"/>
+                </a:solidFill>
+                <a:latin typeface="Arial"/>
+                <a:cs typeface="Arial"/>
+              </a:rPr>
+              <a:t>CNN</a:t>
+            </a:r>
+            <a:r>
+              <a:rPr lang="zh-Hans" altLang="en-US" sz="4320" b="1" dirty="0">
+                <a:solidFill>
+                  <a:srgbClr val="2D669D"/>
+                </a:solidFill>
+                <a:latin typeface="Arial"/>
+                <a:cs typeface="Arial"/>
+              </a:rPr>
+              <a:t> </a:t>
+            </a:r>
+            <a:r>
+              <a:rPr lang="en-US" altLang="zh-Hans" sz="4320" b="1" dirty="0">
+                <a:solidFill>
+                  <a:srgbClr val="2D669D"/>
+                </a:solidFill>
+                <a:latin typeface="Arial"/>
+                <a:cs typeface="Arial"/>
+              </a:rPr>
+              <a:t>Model</a:t>
+            </a:r>
+            <a:endParaRPr lang="en-US" sz="2401" dirty="0"/>
+          </a:p>
+          <a:p>
+            <a:pPr marL="411440" indent="-411440" algn="just">
+              <a:buFont typeface="Arial" panose="020B0604020202020204" pitchFamily="34" charset="0"/>
+              <a:buChar char="•"/>
+            </a:pPr>
+            <a:r>
+              <a:rPr lang="en-US" altLang="zh-Hans" sz="2401" dirty="0"/>
+              <a:t>We</a:t>
+            </a:r>
+            <a:r>
+              <a:rPr lang="zh-Hans" altLang="en-US" sz="2401" dirty="0"/>
+              <a:t> </a:t>
+            </a:r>
+            <a:r>
+              <a:rPr lang="en-US" altLang="zh-Hans" sz="2401" dirty="0"/>
+              <a:t>take</a:t>
+            </a:r>
+            <a:r>
+              <a:rPr lang="zh-Hans" altLang="en-US" sz="2401" dirty="0"/>
+              <a:t> </a:t>
+            </a:r>
+            <a:r>
+              <a:rPr lang="en-US" altLang="zh-Hans" sz="2401" dirty="0"/>
+              <a:t>a</a:t>
+            </a:r>
+            <a:r>
+              <a:rPr lang="zh-Hans" altLang="en-US" sz="2401" dirty="0"/>
+              <a:t> </a:t>
+            </a:r>
+            <a:r>
+              <a:rPr lang="en-US" altLang="zh-Hans" sz="2401" dirty="0"/>
+              <a:t>Convolutional</a:t>
+            </a:r>
+            <a:r>
+              <a:rPr lang="zh-Hans" altLang="en-US" sz="2401" dirty="0"/>
+              <a:t> </a:t>
+            </a:r>
+            <a:r>
+              <a:rPr lang="en-US" altLang="zh-Hans" sz="2401" dirty="0"/>
+              <a:t>Neural</a:t>
+            </a:r>
+            <a:r>
+              <a:rPr lang="zh-Hans" altLang="en-US" sz="2401" dirty="0"/>
+              <a:t> </a:t>
+            </a:r>
+            <a:r>
+              <a:rPr lang="en-US" altLang="zh-Hans" sz="2401" dirty="0"/>
+              <a:t>Network(CNN)</a:t>
+            </a:r>
+            <a:r>
+              <a:rPr lang="zh-Hans" altLang="en-US" sz="2401" dirty="0"/>
+              <a:t> </a:t>
+            </a:r>
+            <a:r>
+              <a:rPr lang="en-US" altLang="zh-Hans" sz="2401" dirty="0"/>
+              <a:t>approach</a:t>
+            </a:r>
+            <a:r>
+              <a:rPr lang="zh-Hans" altLang="en-US" sz="2401" dirty="0"/>
+              <a:t> </a:t>
+            </a:r>
+            <a:r>
+              <a:rPr lang="en-US" altLang="zh-Hans" sz="2401" dirty="0"/>
+              <a:t>in</a:t>
+            </a:r>
+            <a:r>
+              <a:rPr lang="zh-Hans" altLang="en-US" sz="2401" dirty="0"/>
+              <a:t> </a:t>
+            </a:r>
+            <a:r>
+              <a:rPr lang="en-US" altLang="zh-Hans" sz="2401" dirty="0"/>
+              <a:t>a</a:t>
+            </a:r>
+            <a:r>
+              <a:rPr lang="zh-Hans" altLang="en-US" sz="2401" dirty="0"/>
+              <a:t> </a:t>
+            </a:r>
+            <a:r>
+              <a:rPr lang="en-US" altLang="zh-Hans" sz="2401" dirty="0"/>
+              <a:t>way</a:t>
+            </a:r>
+            <a:r>
+              <a:rPr lang="zh-Hans" altLang="en-US" sz="2401" dirty="0"/>
+              <a:t> </a:t>
+            </a:r>
+            <a:r>
+              <a:rPr lang="en-US" altLang="zh-Hans" sz="2401" dirty="0"/>
+              <a:t>that</a:t>
+            </a:r>
+            <a:r>
+              <a:rPr lang="zh-Hans" altLang="en-US" sz="2401" dirty="0"/>
+              <a:t> </a:t>
+            </a:r>
+            <a:r>
+              <a:rPr lang="en-US" altLang="zh-Hans" sz="2401" dirty="0"/>
+              <a:t>is</a:t>
+            </a:r>
+            <a:r>
+              <a:rPr lang="zh-Hans" altLang="en-US" sz="2401" dirty="0"/>
+              <a:t> </a:t>
+            </a:r>
+            <a:r>
+              <a:rPr lang="en-US" altLang="zh-Hans" sz="2401" dirty="0"/>
+              <a:t>similar</a:t>
+            </a:r>
+            <a:r>
+              <a:rPr lang="zh-Hans" altLang="en-US" sz="2401" dirty="0"/>
+              <a:t> </a:t>
+            </a:r>
+            <a:r>
+              <a:rPr lang="en-US" altLang="zh-Hans" sz="2401" dirty="0"/>
+              <a:t>to</a:t>
+            </a:r>
+            <a:r>
+              <a:rPr lang="zh-Hans" altLang="en-US" sz="2401" dirty="0"/>
+              <a:t> </a:t>
+            </a:r>
+            <a:r>
+              <a:rPr lang="en-US" altLang="zh-Hans" sz="2401" dirty="0" err="1"/>
+              <a:t>Autoencoder</a:t>
+            </a:r>
+            <a:r>
+              <a:rPr lang="en-US" altLang="zh-Hans" sz="2401" dirty="0"/>
+              <a:t>.</a:t>
+            </a:r>
+            <a:r>
+              <a:rPr lang="zh-Hans" altLang="en-US" sz="2401" dirty="0"/>
+              <a:t> </a:t>
+            </a:r>
+            <a:r>
+              <a:rPr lang="en-US" altLang="zh-Hans" sz="2401" dirty="0"/>
+              <a:t>By</a:t>
+            </a:r>
+            <a:r>
+              <a:rPr lang="zh-Hans" altLang="en-US" sz="2401" dirty="0"/>
+              <a:t> </a:t>
+            </a:r>
+            <a:r>
+              <a:rPr lang="en-US" altLang="zh-Hans" sz="2401" dirty="0"/>
+              <a:t>compressing</a:t>
+            </a:r>
+            <a:r>
+              <a:rPr lang="zh-Hans" altLang="en-US" sz="2401" dirty="0"/>
+              <a:t> </a:t>
+            </a:r>
+            <a:r>
+              <a:rPr lang="en-US" altLang="zh-Hans" sz="2401" dirty="0"/>
+              <a:t>and</a:t>
+            </a:r>
+            <a:r>
+              <a:rPr lang="zh-Hans" altLang="en-US" sz="2401" dirty="0"/>
+              <a:t> </a:t>
+            </a:r>
+            <a:r>
+              <a:rPr lang="en-US" altLang="zh-Hans" sz="2401" dirty="0"/>
+              <a:t>decompressing</a:t>
+            </a:r>
+            <a:r>
+              <a:rPr lang="zh-Hans" altLang="en-US" sz="2401" dirty="0"/>
+              <a:t> </a:t>
+            </a:r>
+            <a:r>
+              <a:rPr lang="en-US" altLang="zh-Hans" sz="2401" dirty="0"/>
+              <a:t>the</a:t>
+            </a:r>
+            <a:r>
+              <a:rPr lang="zh-Hans" altLang="en-US" sz="2401" dirty="0"/>
+              <a:t> </a:t>
+            </a:r>
+            <a:r>
+              <a:rPr lang="en-US" altLang="zh-Hans" sz="2401" dirty="0"/>
+              <a:t>MRI</a:t>
+            </a:r>
+            <a:r>
+              <a:rPr lang="zh-Hans" altLang="en-US" sz="2401" dirty="0"/>
+              <a:t> </a:t>
+            </a:r>
+            <a:r>
+              <a:rPr lang="en-US" altLang="zh-Hans" sz="2401" dirty="0"/>
+              <a:t>images,</a:t>
+            </a:r>
+            <a:r>
+              <a:rPr lang="zh-Hans" altLang="en-US" sz="2401" dirty="0"/>
+              <a:t> </a:t>
+            </a:r>
+            <a:r>
+              <a:rPr lang="en-US" altLang="zh-Hans" sz="2401" dirty="0"/>
+              <a:t>our</a:t>
+            </a:r>
+            <a:r>
+              <a:rPr lang="zh-Hans" altLang="en-US" sz="2401" dirty="0"/>
+              <a:t> </a:t>
+            </a:r>
+            <a:r>
+              <a:rPr lang="en-US" altLang="zh-Hans" sz="2401" dirty="0"/>
+              <a:t>model</a:t>
+            </a:r>
+            <a:r>
+              <a:rPr lang="zh-Hans" altLang="en-US" sz="2401" dirty="0"/>
+              <a:t> </a:t>
+            </a:r>
+            <a:r>
+              <a:rPr lang="en-US" altLang="zh-Hans" sz="2401" dirty="0"/>
+              <a:t>tries</a:t>
+            </a:r>
+            <a:r>
+              <a:rPr lang="zh-Hans" altLang="en-US" sz="2401" dirty="0"/>
+              <a:t> </a:t>
+            </a:r>
+            <a:r>
+              <a:rPr lang="en-US" altLang="zh-Hans" sz="2401" dirty="0"/>
+              <a:t>to</a:t>
+            </a:r>
+            <a:r>
+              <a:rPr lang="zh-Hans" altLang="en-US" sz="2401" dirty="0"/>
+              <a:t> </a:t>
+            </a:r>
+            <a:r>
+              <a:rPr lang="en-US" altLang="zh-Hans" sz="2401" dirty="0"/>
+              <a:t>learn</a:t>
+            </a:r>
+            <a:r>
+              <a:rPr lang="zh-Hans" altLang="en-US" sz="2401" dirty="0"/>
+              <a:t> </a:t>
+            </a:r>
+            <a:r>
+              <a:rPr lang="en-US" altLang="zh-Hans" sz="2401" dirty="0"/>
+              <a:t>the</a:t>
+            </a:r>
+            <a:r>
+              <a:rPr lang="zh-Hans" altLang="en-US" sz="2401" dirty="0"/>
+              <a:t> </a:t>
+            </a:r>
+            <a:r>
+              <a:rPr lang="en-US" altLang="zh-Hans" sz="2401" dirty="0"/>
+              <a:t>representative</a:t>
+            </a:r>
+            <a:r>
+              <a:rPr lang="zh-Hans" altLang="en-US" sz="2401" dirty="0"/>
+              <a:t> </a:t>
+            </a:r>
+            <a:r>
+              <a:rPr lang="en-US" altLang="zh-Hans" sz="2401" dirty="0"/>
+              <a:t>features</a:t>
+            </a:r>
+            <a:r>
+              <a:rPr lang="zh-Hans" altLang="en-US" sz="2401" dirty="0"/>
+              <a:t> </a:t>
+            </a:r>
+            <a:r>
+              <a:rPr lang="en-US" altLang="zh-Hans" sz="2401" dirty="0"/>
+              <a:t>of</a:t>
+            </a:r>
+            <a:r>
+              <a:rPr lang="zh-Hans" altLang="en-US" sz="2401" dirty="0"/>
+              <a:t> </a:t>
+            </a:r>
+            <a:r>
+              <a:rPr lang="en-US" altLang="zh-Hans" sz="2401" dirty="0"/>
+              <a:t>the</a:t>
+            </a:r>
+            <a:r>
+              <a:rPr lang="zh-Hans" altLang="en-US" sz="2401" dirty="0"/>
+              <a:t> </a:t>
+            </a:r>
+            <a:r>
+              <a:rPr lang="en-US" altLang="zh-Hans" sz="2401" dirty="0"/>
+              <a:t>brain</a:t>
+            </a:r>
+            <a:r>
+              <a:rPr lang="zh-Hans" altLang="en-US" sz="2401" dirty="0"/>
+              <a:t> </a:t>
+            </a:r>
+            <a:r>
+              <a:rPr lang="en-US" altLang="zh-Hans" sz="2401" dirty="0"/>
+              <a:t>structures.</a:t>
+            </a:r>
+            <a:r>
+              <a:rPr lang="zh-Hans" altLang="en-US" sz="2401" dirty="0"/>
+              <a:t> </a:t>
+            </a:r>
+            <a:r>
+              <a:rPr lang="en-US" altLang="zh-Hans" sz="2401" dirty="0"/>
+              <a:t>In encoder part of the model, we choose three convolution layers with three max pooling layers. For the decoder part, we use three convolution layers, three deconvolution layers and an extra reconstruction layer to reconstruct the input image. Figure 3 below is an illustration of our model.</a:t>
+            </a:r>
+          </a:p>
+          <a:p>
+            <a:pPr algn="just"/>
+            <a:endParaRPr lang="en-US" altLang="zh-Hans" sz="2401" dirty="0"/>
+          </a:p>
+          <a:p>
+            <a:pPr algn="just"/>
+            <a:endParaRPr lang="en-US" altLang="zh-Hans" sz="2401" dirty="0"/>
+          </a:p>
+          <a:p>
+            <a:pPr algn="just"/>
+            <a:endParaRPr lang="en-US" altLang="zh-Hans" sz="2401" dirty="0"/>
+          </a:p>
+          <a:p>
+            <a:pPr algn="just"/>
+            <a:endParaRPr lang="en-US" altLang="zh-Hans" sz="2401" dirty="0"/>
+          </a:p>
+          <a:p>
+            <a:pPr algn="just"/>
+            <a:endParaRPr lang="en-US" altLang="zh-Hans" sz="2401" dirty="0"/>
+          </a:p>
+          <a:p>
+            <a:pPr algn="just"/>
+            <a:endParaRPr lang="en-US" altLang="zh-Hans" sz="2401" dirty="0"/>
+          </a:p>
+          <a:p>
+            <a:pPr algn="just"/>
+            <a:endParaRPr lang="en-US" altLang="zh-Hans" sz="2401" dirty="0"/>
+          </a:p>
+          <a:p>
+            <a:pPr algn="just"/>
+            <a:endParaRPr lang="en-US" altLang="zh-Hans" sz="2401" dirty="0"/>
+          </a:p>
+          <a:p>
+            <a:pPr algn="just"/>
+            <a:endParaRPr lang="en-US" sz="2401" dirty="0"/>
+          </a:p>
+          <a:p>
+            <a:endParaRPr lang="en-US" altLang="zh-Hans" sz="2160" dirty="0">
+              <a:latin typeface="Arial"/>
+              <a:cs typeface="Arial"/>
+            </a:endParaRPr>
+          </a:p>
+          <a:p>
+            <a:pPr marL="411440" indent="-411440">
+              <a:buFont typeface="Arial"/>
+              <a:buChar char="•"/>
+            </a:pPr>
+            <a:r>
+              <a:rPr lang="en-US" altLang="zh-Hans" sz="2160" dirty="0">
+                <a:latin typeface="Arial"/>
+                <a:cs typeface="Arial"/>
+              </a:rPr>
+              <a:t>We</a:t>
+            </a:r>
+            <a:r>
+              <a:rPr lang="zh-Hans" altLang="en-US" sz="2160" dirty="0">
+                <a:latin typeface="Arial"/>
+                <a:cs typeface="Arial"/>
+              </a:rPr>
+              <a:t> </a:t>
+            </a:r>
+            <a:r>
+              <a:rPr lang="en-US" altLang="zh-Hans" sz="2160" dirty="0">
+                <a:latin typeface="Arial"/>
+                <a:cs typeface="Arial"/>
+              </a:rPr>
+              <a:t>trained</a:t>
+            </a:r>
+            <a:r>
+              <a:rPr lang="zh-Hans" altLang="en-US" sz="2160" dirty="0">
+                <a:latin typeface="Arial"/>
+                <a:cs typeface="Arial"/>
+              </a:rPr>
+              <a:t> </a:t>
+            </a:r>
+            <a:r>
+              <a:rPr lang="en-US" altLang="zh-Hans" sz="2160" dirty="0">
+                <a:latin typeface="Arial"/>
+                <a:cs typeface="Arial"/>
+              </a:rPr>
+              <a:t>our</a:t>
+            </a:r>
+            <a:r>
+              <a:rPr lang="zh-Hans" altLang="en-US" sz="2160" dirty="0">
+                <a:latin typeface="Arial"/>
+                <a:cs typeface="Arial"/>
+              </a:rPr>
+              <a:t> </a:t>
+            </a:r>
+            <a:r>
+              <a:rPr lang="en-US" altLang="zh-Hans" sz="2160" dirty="0">
+                <a:latin typeface="Arial"/>
+                <a:cs typeface="Arial"/>
+              </a:rPr>
+              <a:t>model</a:t>
+            </a:r>
+            <a:r>
+              <a:rPr lang="zh-Hans" altLang="en-US" sz="2160" dirty="0">
+                <a:latin typeface="Arial"/>
+                <a:cs typeface="Arial"/>
+              </a:rPr>
+              <a:t> </a:t>
+            </a:r>
+            <a:r>
+              <a:rPr lang="en-US" altLang="zh-Hans" sz="2160" dirty="0">
+                <a:latin typeface="Arial"/>
+                <a:cs typeface="Arial"/>
+              </a:rPr>
+              <a:t>using</a:t>
+            </a:r>
+            <a:r>
+              <a:rPr lang="zh-Hans" altLang="en-US" sz="2160" dirty="0">
+                <a:latin typeface="Arial"/>
+                <a:cs typeface="Arial"/>
+              </a:rPr>
+              <a:t> </a:t>
+            </a:r>
+            <a:r>
+              <a:rPr lang="en-US" altLang="zh-Hans" sz="2160" dirty="0">
+                <a:latin typeface="Arial"/>
+                <a:cs typeface="Arial"/>
+              </a:rPr>
+              <a:t>700</a:t>
+            </a:r>
+            <a:r>
+              <a:rPr lang="zh-Hans" altLang="en-US" sz="2160" dirty="0">
+                <a:latin typeface="Arial"/>
+                <a:cs typeface="Arial"/>
+              </a:rPr>
+              <a:t> </a:t>
+            </a:r>
+            <a:r>
+              <a:rPr lang="en-US" altLang="zh-Hans" sz="2160" dirty="0">
+                <a:latin typeface="Arial"/>
+                <a:cs typeface="Arial"/>
+              </a:rPr>
+              <a:t>MRI</a:t>
+            </a:r>
+            <a:r>
+              <a:rPr lang="zh-Hans" altLang="en-US" sz="2160" dirty="0">
+                <a:latin typeface="Arial"/>
+                <a:cs typeface="Arial"/>
+              </a:rPr>
+              <a:t> </a:t>
+            </a:r>
+            <a:r>
+              <a:rPr lang="en-US" altLang="zh-Hans" sz="2160" dirty="0">
+                <a:latin typeface="Arial"/>
+                <a:cs typeface="Arial"/>
+              </a:rPr>
+              <a:t>images</a:t>
+            </a:r>
+            <a:r>
+              <a:rPr lang="zh-Hans" altLang="en-US" sz="2160" dirty="0">
+                <a:latin typeface="Arial"/>
+                <a:cs typeface="Arial"/>
+              </a:rPr>
+              <a:t> </a:t>
+            </a:r>
+            <a:r>
+              <a:rPr lang="en-US" altLang="zh-Hans" sz="2160" dirty="0">
+                <a:latin typeface="Arial"/>
+                <a:cs typeface="Arial"/>
+              </a:rPr>
+              <a:t>and</a:t>
+            </a:r>
+            <a:r>
+              <a:rPr lang="zh-Hans" altLang="en-US" sz="2160" dirty="0">
+                <a:latin typeface="Arial"/>
+                <a:cs typeface="Arial"/>
+              </a:rPr>
+              <a:t> </a:t>
+            </a:r>
+            <a:r>
+              <a:rPr lang="en-US" altLang="zh-Hans" sz="2160" dirty="0">
+                <a:latin typeface="Arial"/>
+                <a:cs typeface="Arial"/>
+              </a:rPr>
+              <a:t>its</a:t>
+            </a:r>
+            <a:r>
+              <a:rPr lang="zh-Hans" altLang="en-US" sz="2160" dirty="0">
+                <a:latin typeface="Arial"/>
+                <a:cs typeface="Arial"/>
+              </a:rPr>
+              <a:t> </a:t>
+            </a:r>
+            <a:r>
+              <a:rPr lang="en-US" altLang="zh-Hans" sz="2160" dirty="0">
+                <a:latin typeface="Arial"/>
+                <a:cs typeface="Arial"/>
+              </a:rPr>
+              <a:t>corresponding</a:t>
+            </a:r>
+            <a:r>
+              <a:rPr lang="zh-Hans" altLang="en-US" sz="2160" dirty="0">
+                <a:latin typeface="Arial"/>
+                <a:cs typeface="Arial"/>
+              </a:rPr>
+              <a:t> </a:t>
+            </a:r>
+            <a:r>
+              <a:rPr lang="en-US" altLang="zh-Hans" sz="2160" dirty="0">
+                <a:latin typeface="Arial"/>
+                <a:cs typeface="Arial"/>
+              </a:rPr>
+              <a:t>skull-stripped</a:t>
+            </a:r>
+            <a:r>
+              <a:rPr lang="zh-Hans" altLang="en-US" sz="2160" dirty="0">
+                <a:latin typeface="Arial"/>
+                <a:cs typeface="Arial"/>
+              </a:rPr>
+              <a:t> </a:t>
+            </a:r>
+            <a:r>
+              <a:rPr lang="en-US" altLang="zh-Hans" sz="2160" dirty="0">
+                <a:latin typeface="Arial"/>
+                <a:cs typeface="Arial"/>
+              </a:rPr>
+              <a:t>images</a:t>
+            </a:r>
+            <a:r>
+              <a:rPr lang="zh-Hans" altLang="en-US" sz="2160" dirty="0">
+                <a:latin typeface="Arial"/>
+                <a:cs typeface="Arial"/>
+              </a:rPr>
+              <a:t> </a:t>
+            </a:r>
+            <a:r>
+              <a:rPr lang="en-US" altLang="zh-Hans" sz="2160" dirty="0">
+                <a:latin typeface="Arial"/>
+                <a:cs typeface="Arial"/>
+              </a:rPr>
+              <a:t>with</a:t>
+            </a:r>
+            <a:r>
+              <a:rPr lang="zh-Hans" altLang="en-US" sz="2160" dirty="0">
+                <a:latin typeface="Arial"/>
+                <a:cs typeface="Arial"/>
+              </a:rPr>
+              <a:t> </a:t>
+            </a:r>
+            <a:r>
+              <a:rPr lang="en-US" altLang="zh-Hans" sz="2160" dirty="0">
+                <a:latin typeface="Arial"/>
+                <a:cs typeface="Arial"/>
+              </a:rPr>
+              <a:t>batch</a:t>
+            </a:r>
+            <a:r>
+              <a:rPr lang="zh-Hans" altLang="en-US" sz="2160" dirty="0">
+                <a:latin typeface="Arial"/>
+                <a:cs typeface="Arial"/>
+              </a:rPr>
+              <a:t> </a:t>
+            </a:r>
+            <a:r>
+              <a:rPr lang="en-US" altLang="zh-Hans" sz="2160" dirty="0">
+                <a:latin typeface="Arial"/>
+                <a:cs typeface="Arial"/>
+              </a:rPr>
+              <a:t>size</a:t>
+            </a:r>
+            <a:r>
+              <a:rPr lang="zh-Hans" altLang="en-US" sz="2160" dirty="0">
+                <a:latin typeface="Arial"/>
+                <a:cs typeface="Arial"/>
+              </a:rPr>
+              <a:t> </a:t>
+            </a:r>
+            <a:r>
+              <a:rPr lang="en-US" altLang="zh-Hans" sz="2160" dirty="0">
+                <a:latin typeface="Arial"/>
+                <a:cs typeface="Arial"/>
+              </a:rPr>
+              <a:t>15,</a:t>
+            </a:r>
+            <a:r>
+              <a:rPr lang="zh-Hans" altLang="en-US" sz="2160" dirty="0">
+                <a:latin typeface="Arial"/>
+                <a:cs typeface="Arial"/>
+              </a:rPr>
+              <a:t> </a:t>
+            </a:r>
+            <a:r>
+              <a:rPr lang="en-US" altLang="zh-Hans" sz="2160" dirty="0">
+                <a:latin typeface="Arial"/>
+                <a:cs typeface="Arial"/>
+              </a:rPr>
+              <a:t>learning</a:t>
+            </a:r>
+            <a:r>
+              <a:rPr lang="zh-Hans" altLang="en-US" sz="2160" dirty="0">
+                <a:latin typeface="Arial"/>
+                <a:cs typeface="Arial"/>
+              </a:rPr>
+              <a:t> </a:t>
+            </a:r>
+            <a:r>
+              <a:rPr lang="en-US" altLang="zh-Hans" sz="2160" dirty="0">
+                <a:latin typeface="Arial"/>
+                <a:cs typeface="Arial"/>
+              </a:rPr>
+              <a:t>rate</a:t>
+            </a:r>
+            <a:r>
+              <a:rPr lang="zh-Hans" altLang="en-US" sz="2160" dirty="0">
+                <a:latin typeface="Arial"/>
+                <a:cs typeface="Arial"/>
+              </a:rPr>
+              <a:t> </a:t>
+            </a:r>
+            <a:r>
+              <a:rPr lang="en-US" altLang="zh-Hans" sz="2160" dirty="0">
+                <a:latin typeface="Arial"/>
+                <a:cs typeface="Arial"/>
+              </a:rPr>
+              <a:t>0.003</a:t>
+            </a:r>
+            <a:r>
+              <a:rPr lang="zh-Hans" altLang="en-US" sz="2160" dirty="0">
+                <a:latin typeface="Arial"/>
+                <a:cs typeface="Arial"/>
+              </a:rPr>
+              <a:t> </a:t>
+            </a:r>
+            <a:r>
+              <a:rPr lang="en-US" altLang="zh-Hans" sz="2160" dirty="0">
+                <a:latin typeface="Arial"/>
+                <a:cs typeface="Arial"/>
+              </a:rPr>
+              <a:t>and</a:t>
+            </a:r>
+            <a:r>
+              <a:rPr lang="zh-Hans" altLang="en-US" sz="2160" dirty="0">
+                <a:latin typeface="Arial"/>
+                <a:cs typeface="Arial"/>
+              </a:rPr>
+              <a:t> </a:t>
+            </a:r>
+            <a:r>
+              <a:rPr lang="en-US" altLang="zh-Hans" sz="2160" dirty="0">
+                <a:latin typeface="Arial"/>
+                <a:cs typeface="Arial"/>
+              </a:rPr>
+              <a:t>50</a:t>
+            </a:r>
+            <a:r>
+              <a:rPr lang="zh-Hans" altLang="en-US" sz="2160" dirty="0">
+                <a:latin typeface="Arial"/>
+                <a:cs typeface="Arial"/>
+              </a:rPr>
+              <a:t> </a:t>
+            </a:r>
+            <a:r>
+              <a:rPr lang="en-US" altLang="zh-Hans" sz="2160" dirty="0">
+                <a:latin typeface="Arial"/>
+                <a:cs typeface="Arial"/>
+              </a:rPr>
+              <a:t>epochs,</a:t>
+            </a:r>
+            <a:r>
+              <a:rPr lang="zh-Hans" altLang="en-US" sz="2160" dirty="0">
+                <a:latin typeface="Arial"/>
+                <a:cs typeface="Arial"/>
+              </a:rPr>
+              <a:t> </a:t>
+            </a:r>
+            <a:r>
+              <a:rPr lang="en-US" altLang="zh-Hans" sz="2160" dirty="0">
+                <a:latin typeface="Arial"/>
+                <a:cs typeface="Arial"/>
+              </a:rPr>
+              <a:t>by</a:t>
+            </a:r>
+            <a:r>
+              <a:rPr lang="zh-Hans" altLang="en-US" sz="2160" dirty="0">
+                <a:latin typeface="Arial"/>
+                <a:cs typeface="Arial"/>
+              </a:rPr>
+              <a:t> </a:t>
+            </a:r>
+            <a:r>
+              <a:rPr lang="en-US" altLang="zh-Hans" sz="2160" dirty="0">
+                <a:latin typeface="Arial"/>
+                <a:cs typeface="Arial"/>
+              </a:rPr>
+              <a:t>optimizing</a:t>
+            </a:r>
+            <a:r>
+              <a:rPr lang="zh-Hans" altLang="en-US" sz="2160" dirty="0">
+                <a:latin typeface="Arial"/>
+                <a:cs typeface="Arial"/>
+              </a:rPr>
+              <a:t> </a:t>
+            </a:r>
+            <a:r>
+              <a:rPr lang="en-US" altLang="zh-Hans" sz="2160" dirty="0">
+                <a:latin typeface="Arial"/>
+                <a:cs typeface="Arial"/>
+              </a:rPr>
+              <a:t>the</a:t>
+            </a:r>
+            <a:r>
+              <a:rPr lang="zh-Hans" altLang="en-US" sz="2160" dirty="0">
+                <a:latin typeface="Arial"/>
+                <a:cs typeface="Arial"/>
+              </a:rPr>
+              <a:t> </a:t>
+            </a:r>
+            <a:r>
+              <a:rPr lang="en-US" altLang="zh-Hans" sz="2160" dirty="0">
+                <a:latin typeface="Arial"/>
+                <a:cs typeface="Arial"/>
+              </a:rPr>
+              <a:t>equation</a:t>
+            </a:r>
+            <a:r>
+              <a:rPr lang="zh-Hans" altLang="en-US" sz="2160" dirty="0">
+                <a:latin typeface="Arial"/>
+                <a:cs typeface="Arial"/>
+              </a:rPr>
+              <a:t> </a:t>
+            </a:r>
+            <a:r>
+              <a:rPr lang="en-US" altLang="zh-Hans" sz="2160" dirty="0">
+                <a:latin typeface="Arial"/>
+                <a:cs typeface="Arial"/>
+              </a:rPr>
+              <a:t>(1).</a:t>
+            </a:r>
+            <a:r>
+              <a:rPr lang="zh-Hans" altLang="en-US" sz="2160" dirty="0">
+                <a:latin typeface="Arial"/>
+                <a:cs typeface="Arial"/>
+              </a:rPr>
+              <a:t> </a:t>
+            </a:r>
+            <a:r>
+              <a:rPr lang="en-US" altLang="zh-Hans" sz="2160" dirty="0">
+                <a:latin typeface="Arial"/>
+                <a:cs typeface="Arial"/>
+              </a:rPr>
+              <a:t>Figure</a:t>
+            </a:r>
+            <a:r>
+              <a:rPr lang="zh-Hans" altLang="en-US" sz="2160" dirty="0">
+                <a:latin typeface="Arial"/>
+                <a:cs typeface="Arial"/>
+              </a:rPr>
+              <a:t> </a:t>
+            </a:r>
+            <a:r>
+              <a:rPr lang="en-US" altLang="zh-Hans" sz="2160" dirty="0">
+                <a:latin typeface="Arial"/>
+                <a:cs typeface="Arial"/>
+              </a:rPr>
+              <a:t>4</a:t>
+            </a:r>
+            <a:r>
+              <a:rPr lang="zh-Hans" altLang="en-US" sz="2160" dirty="0">
+                <a:latin typeface="Arial"/>
+                <a:cs typeface="Arial"/>
+              </a:rPr>
+              <a:t> </a:t>
+            </a:r>
+            <a:r>
+              <a:rPr lang="en-US" altLang="zh-Hans" sz="2160" dirty="0">
+                <a:latin typeface="Arial"/>
+                <a:cs typeface="Arial"/>
+              </a:rPr>
+              <a:t>above</a:t>
+            </a:r>
+            <a:r>
+              <a:rPr lang="zh-Hans" altLang="en-US" sz="2160" dirty="0">
+                <a:latin typeface="Arial"/>
+                <a:cs typeface="Arial"/>
+              </a:rPr>
+              <a:t> </a:t>
+            </a:r>
+            <a:r>
+              <a:rPr lang="en-US" altLang="zh-Hans" sz="2160" dirty="0">
+                <a:latin typeface="Arial"/>
+                <a:cs typeface="Arial"/>
+              </a:rPr>
+              <a:t>is</a:t>
+            </a:r>
+            <a:r>
+              <a:rPr lang="zh-Hans" altLang="en-US" sz="2160" dirty="0">
+                <a:latin typeface="Arial"/>
+                <a:cs typeface="Arial"/>
+              </a:rPr>
+              <a:t> </a:t>
+            </a:r>
+            <a:r>
+              <a:rPr lang="en-US" altLang="zh-Hans" sz="2160" dirty="0">
+                <a:latin typeface="Arial"/>
+                <a:cs typeface="Arial"/>
+              </a:rPr>
+              <a:t>the</a:t>
+            </a:r>
+            <a:r>
+              <a:rPr lang="zh-Hans" altLang="en-US" sz="2160" dirty="0">
+                <a:latin typeface="Arial"/>
+                <a:cs typeface="Arial"/>
+              </a:rPr>
+              <a:t> </a:t>
+            </a:r>
+            <a:r>
+              <a:rPr lang="en-US" altLang="zh-Hans" sz="2160" dirty="0">
+                <a:latin typeface="Arial"/>
+                <a:cs typeface="Arial"/>
+              </a:rPr>
+              <a:t>training</a:t>
+            </a:r>
+            <a:r>
+              <a:rPr lang="zh-Hans" altLang="en-US" sz="2160" dirty="0">
+                <a:latin typeface="Arial"/>
+                <a:cs typeface="Arial"/>
+              </a:rPr>
+              <a:t> </a:t>
+            </a:r>
+            <a:r>
+              <a:rPr lang="en-US" altLang="zh-Hans" sz="2160" dirty="0">
+                <a:latin typeface="Arial"/>
+                <a:cs typeface="Arial"/>
+              </a:rPr>
+              <a:t>loss.</a:t>
+            </a:r>
+          </a:p>
+          <a:p>
+            <a:pPr marL="411440" indent="-411440">
+              <a:buFont typeface="Arial"/>
+              <a:buChar char="•"/>
+            </a:pPr>
+            <a:endParaRPr lang="en-US" altLang="zh-Hans" sz="2160" dirty="0">
+              <a:latin typeface="Arial"/>
+              <a:cs typeface="Arial"/>
+            </a:endParaRPr>
+          </a:p>
+          <a:p>
+            <a:pPr marL="411440" indent="-411440">
+              <a:buFont typeface="Arial"/>
+              <a:buChar char="•"/>
+            </a:pPr>
+            <a:r>
+              <a:rPr lang="en-US" altLang="zh-Hans" sz="2160" dirty="0">
+                <a:latin typeface="Arial"/>
+                <a:cs typeface="Arial"/>
+              </a:rPr>
+              <a:t>After numerous experiments, we found our model is able to detect the region of brain, but cannot reconstruct the stripped image with resolution as high as the input. Since skull stripping is a preprocessing step for other diagnosis, which requires high resolution brain images, we use reconstructed images as bitmasks applied to unstripped images. As shown below:</a:t>
+            </a:r>
+          </a:p>
+          <a:p>
+            <a:pPr marL="411440" indent="-411440">
+              <a:buFont typeface="Arial"/>
+              <a:buChar char="•"/>
+            </a:pPr>
+            <a:endParaRPr lang="en-US" altLang="zh-Hans" sz="2160" dirty="0">
+              <a:latin typeface="Arial"/>
+              <a:cs typeface="Arial"/>
+            </a:endParaRPr>
+          </a:p>
+          <a:p>
+            <a:pPr marL="411440" indent="-411440">
+              <a:buFont typeface="Arial"/>
+              <a:buChar char="•"/>
+            </a:pPr>
+            <a:endParaRPr lang="en-US" sz="2160" dirty="0">
+              <a:latin typeface="Arial"/>
+              <a:cs typeface="Arial"/>
+            </a:endParaRPr>
+          </a:p>
+          <a:p>
+            <a:pPr marL="411440" indent="-411440">
+              <a:buFont typeface="Arial"/>
+              <a:buChar char="•"/>
+            </a:pPr>
+            <a:endParaRPr lang="en-US" sz="2160" dirty="0">
+              <a:latin typeface="Arial"/>
+              <a:cs typeface="Arial"/>
+            </a:endParaRPr>
+          </a:p>
+        </p:txBody>
+      </p:sp>
+      <p:sp>
+        <p:nvSpPr>
+          <p:cNvPr id="16" name="TextBox 15"/>
+          <p:cNvSpPr txBox="1"/>
+          <p:nvPr/>
+        </p:nvSpPr>
+        <p:spPr>
+          <a:xfrm>
+            <a:off x="10390909" y="11324268"/>
+            <a:ext cx="9577703" cy="424732"/>
+          </a:xfrm>
+          <a:prstGeom prst="rect">
+            <a:avLst/>
+          </a:prstGeom>
+          <a:noFill/>
+        </p:spPr>
+        <p:txBody>
+          <a:bodyPr wrap="square" rtlCol="0">
+            <a:spAutoFit/>
+          </a:bodyPr>
+          <a:lstStyle/>
+          <a:p>
+            <a:r>
+              <a:rPr lang="zh-Hans" altLang="en-US" sz="2160" i="1" dirty="0">
+                <a:solidFill>
+                  <a:srgbClr val="8C8C83"/>
+                </a:solidFill>
+                <a:cs typeface="Arial"/>
+              </a:rPr>
+              <a:t>                                </a:t>
+            </a:r>
+            <a:r>
+              <a:rPr lang="en-US" sz="2160" i="1" dirty="0">
+                <a:solidFill>
+                  <a:srgbClr val="8C8C83"/>
+                </a:solidFill>
+                <a:cs typeface="Arial"/>
+              </a:rPr>
+              <a:t>Figure </a:t>
+            </a:r>
+            <a:r>
+              <a:rPr lang="en-US" altLang="zh-Hans" sz="2160" i="1" dirty="0">
+                <a:solidFill>
+                  <a:srgbClr val="8C8C83"/>
+                </a:solidFill>
+                <a:cs typeface="Arial"/>
+              </a:rPr>
+              <a:t>3</a:t>
+            </a:r>
+            <a:r>
+              <a:rPr lang="en-US" sz="2160" i="1" dirty="0">
+                <a:solidFill>
+                  <a:srgbClr val="8C8C83"/>
+                </a:solidFill>
+                <a:cs typeface="Arial"/>
+              </a:rPr>
+              <a:t>. </a:t>
+            </a:r>
+            <a:r>
+              <a:rPr lang="en-US" altLang="zh-Hans" sz="2160" i="1" dirty="0">
+                <a:solidFill>
+                  <a:srgbClr val="8C8C83"/>
+                </a:solidFill>
+                <a:cs typeface="Arial"/>
+              </a:rPr>
+              <a:t>An</a:t>
+            </a:r>
+            <a:r>
+              <a:rPr lang="zh-Hans" altLang="en-US" sz="2160" i="1" dirty="0">
+                <a:solidFill>
+                  <a:srgbClr val="8C8C83"/>
+                </a:solidFill>
+                <a:cs typeface="Arial"/>
+              </a:rPr>
+              <a:t> </a:t>
+            </a:r>
+            <a:r>
+              <a:rPr lang="en-US" altLang="zh-Hans" sz="2160" i="1" dirty="0">
+                <a:solidFill>
+                  <a:srgbClr val="8C8C83"/>
+                </a:solidFill>
+                <a:cs typeface="Arial"/>
+              </a:rPr>
+              <a:t>illustration</a:t>
+            </a:r>
+            <a:r>
+              <a:rPr lang="zh-Hans" altLang="en-US" sz="2160" i="1" dirty="0">
+                <a:solidFill>
+                  <a:srgbClr val="8C8C83"/>
+                </a:solidFill>
+                <a:cs typeface="Arial"/>
+              </a:rPr>
+              <a:t> </a:t>
+            </a:r>
+            <a:r>
+              <a:rPr lang="en-US" altLang="zh-Hans" sz="2160" i="1" dirty="0">
+                <a:solidFill>
+                  <a:srgbClr val="8C8C83"/>
+                </a:solidFill>
+                <a:cs typeface="Arial"/>
+              </a:rPr>
+              <a:t>of</a:t>
+            </a:r>
+            <a:r>
+              <a:rPr lang="zh-Hans" altLang="en-US" sz="2160" i="1" dirty="0">
+                <a:solidFill>
+                  <a:srgbClr val="8C8C83"/>
+                </a:solidFill>
+                <a:cs typeface="Arial"/>
+              </a:rPr>
+              <a:t> </a:t>
+            </a:r>
+            <a:r>
+              <a:rPr lang="en-US" altLang="zh-Hans" sz="2160" i="1" dirty="0">
+                <a:solidFill>
+                  <a:srgbClr val="8C8C83"/>
+                </a:solidFill>
+                <a:cs typeface="Arial"/>
+              </a:rPr>
+              <a:t>our</a:t>
+            </a:r>
+            <a:r>
+              <a:rPr lang="zh-Hans" altLang="en-US" sz="2160" i="1" dirty="0">
+                <a:solidFill>
+                  <a:srgbClr val="8C8C83"/>
+                </a:solidFill>
+                <a:cs typeface="Arial"/>
+              </a:rPr>
+              <a:t> </a:t>
+            </a:r>
+            <a:r>
+              <a:rPr lang="en-US" altLang="zh-Hans" sz="2160" i="1" dirty="0">
+                <a:solidFill>
+                  <a:srgbClr val="8C8C83"/>
+                </a:solidFill>
+                <a:cs typeface="Arial"/>
+              </a:rPr>
+              <a:t>model</a:t>
+            </a:r>
+            <a:r>
+              <a:rPr lang="zh-Hans" altLang="en-US" sz="2160" i="1" dirty="0">
+                <a:solidFill>
+                  <a:srgbClr val="8C8C83"/>
+                </a:solidFill>
+                <a:cs typeface="Arial"/>
+              </a:rPr>
+              <a:t> </a:t>
+            </a:r>
+            <a:endParaRPr lang="en-US" sz="2160" i="1" dirty="0">
+              <a:solidFill>
+                <a:srgbClr val="8C8C83"/>
+              </a:solidFill>
+              <a:cs typeface="Arial"/>
+            </a:endParaRPr>
+          </a:p>
+        </p:txBody>
+      </p:sp>
       <p:sp>
         <p:nvSpPr>
           <p:cNvPr id="24" name="Rectangle 23"/>
@@ -1111,21 +2224,28 @@
                 <a:latin typeface="Arial"/>
                 <a:cs typeface="Arial"/>
               </a:rPr>
-              <a:t>Kaiyuan Chen 60483709 and </a:t>
-            </a:r>
-            <a:r>
-              <a:rPr lang="en-US" sz="2401" b="1" dirty="0" err="1">
-                <a:latin typeface="Arial"/>
-                <a:cs typeface="Arial"/>
-              </a:rPr>
-              <a:t>Jingyue</a:t>
+              <a:t>Kaiyuan Chen 60483709 and Jingyue Shen</a:t>
+            </a:r>
+            <a:r>
+              <a:rPr lang="zh-Hans" altLang="en-US" sz="2401" b="1" dirty="0">
+                <a:latin typeface="Arial"/>
+                <a:cs typeface="Arial"/>
+              </a:rPr>
+              <a:t> </a:t>
+            </a:r>
+            <a:r>
+              <a:rPr lang="en-US" altLang="zh-Hans" sz="2401" b="1" dirty="0">
+                <a:latin typeface="Arial"/>
+                <a:cs typeface="Arial"/>
+              </a:rPr>
+              <a:t>704797256</a:t>
             </a:r>
             <a:r>
               <a:rPr lang="en-US" sz="2401" b="1" dirty="0">
                 <a:latin typeface="Arial"/>
                 <a:cs typeface="Arial"/>
               </a:rPr>
-              <a:t> Shen </a:t>
+              <a:t> </a:t>
             </a:r>
           </a:p>
           <a:p>
@@ -1336,14 +2456,14 @@
       </p:sp>
       <p:sp>
         <p:nvSpPr>
-          <p:cNvPr id="7" name="TextBox 6"/>
+          <p:cNvPr id="9" name="TextBox 8"/>
           <p:cNvSpPr txBox="1"/>
           <p:nvPr/>
         </p:nvSpPr>
         <p:spPr>
           <a:xfrm>
-            <a:off x="11776198" y="5073410"/>
-            <a:ext cx="9326880" cy="5866656"/>
+            <a:off x="22983100" y="6717332"/>
+            <a:ext cx="9052560" cy="13879748"/>
           </a:xfrm>
           <a:prstGeom prst="rect">
             <a:avLst/>
@@ -1356,6 +2476,268 @@
           </a:bodyPr>
           <a:lstStyle/>
           <a:p>
+            <a:endParaRPr lang="en-US" sz="2160" dirty="0">
+              <a:latin typeface="Arial"/>
+              <a:cs typeface="Arial"/>
+            </a:endParaRPr>
+          </a:p>
+          <a:p>
+            <a:pPr marL="342900" indent="-342900">
+              <a:buFont typeface="Arial" panose="020B0604020202020204" pitchFamily="34" charset="0"/>
+              <a:buChar char="•"/>
+            </a:pPr>
+            <a:r>
+              <a:rPr lang="en-US" altLang="zh-Hans" sz="2160" dirty="0">
+                <a:latin typeface="Arial"/>
+                <a:cs typeface="Arial"/>
+              </a:rPr>
+              <a:t>Figure</a:t>
+            </a:r>
+            <a:r>
+              <a:rPr lang="zh-Hans" altLang="en-US" sz="2160" dirty="0">
+                <a:latin typeface="Arial"/>
+                <a:cs typeface="Arial"/>
+              </a:rPr>
+              <a:t> </a:t>
+            </a:r>
+            <a:r>
+              <a:rPr lang="en-US" altLang="zh-Hans" sz="2160" dirty="0">
+                <a:latin typeface="Arial"/>
+                <a:cs typeface="Arial"/>
+              </a:rPr>
+              <a:t>6</a:t>
+            </a:r>
+            <a:r>
+              <a:rPr lang="zh-Hans" altLang="en-US" sz="2160" dirty="0">
+                <a:latin typeface="Arial"/>
+                <a:cs typeface="Arial"/>
+              </a:rPr>
+              <a:t> </a:t>
+            </a:r>
+            <a:r>
+              <a:rPr lang="en-US" altLang="zh-Hans" sz="2160" dirty="0">
+                <a:latin typeface="Arial"/>
+                <a:cs typeface="Arial"/>
+              </a:rPr>
+              <a:t>above</a:t>
+            </a:r>
+            <a:r>
+              <a:rPr lang="zh-Hans" altLang="en-US" sz="2160" dirty="0">
+                <a:latin typeface="Arial"/>
+                <a:cs typeface="Arial"/>
+              </a:rPr>
+              <a:t> </a:t>
+            </a:r>
+            <a:r>
+              <a:rPr lang="en-US" altLang="zh-Hans" sz="2160" dirty="0">
+                <a:latin typeface="Arial"/>
+                <a:cs typeface="Arial"/>
+              </a:rPr>
+              <a:t>are</a:t>
+            </a:r>
+            <a:r>
+              <a:rPr lang="zh-Hans" altLang="en-US" sz="2160" dirty="0">
+                <a:latin typeface="Arial"/>
+                <a:cs typeface="Arial"/>
+              </a:rPr>
+              <a:t> </a:t>
+            </a:r>
+            <a:r>
+              <a:rPr lang="en-US" altLang="zh-Hans" sz="2160" dirty="0">
+                <a:latin typeface="Arial"/>
+                <a:cs typeface="Arial"/>
+              </a:rPr>
+              <a:t>the</a:t>
+            </a:r>
+            <a:r>
+              <a:rPr lang="zh-Hans" altLang="en-US" sz="2160" dirty="0">
+                <a:latin typeface="Arial"/>
+                <a:cs typeface="Arial"/>
+              </a:rPr>
+              <a:t> </a:t>
+            </a:r>
+            <a:r>
+              <a:rPr lang="en-US" altLang="zh-Hans" sz="2160" dirty="0">
+                <a:latin typeface="Arial"/>
+                <a:cs typeface="Arial"/>
+              </a:rPr>
+              <a:t>test</a:t>
+            </a:r>
+            <a:r>
+              <a:rPr lang="zh-Hans" altLang="en-US" sz="2160" dirty="0">
+                <a:latin typeface="Arial"/>
+                <a:cs typeface="Arial"/>
+              </a:rPr>
+              <a:t> </a:t>
+            </a:r>
+            <a:r>
+              <a:rPr lang="en-US" altLang="zh-Hans" sz="2160" dirty="0">
+                <a:latin typeface="Arial"/>
+                <a:cs typeface="Arial"/>
+              </a:rPr>
+              <a:t>results</a:t>
+            </a:r>
+            <a:r>
+              <a:rPr lang="zh-Hans" altLang="en-US" sz="2160" dirty="0">
+                <a:latin typeface="Arial"/>
+                <a:cs typeface="Arial"/>
+              </a:rPr>
+              <a:t> </a:t>
+            </a:r>
+            <a:r>
+              <a:rPr lang="en-US" altLang="zh-Hans" sz="2160" dirty="0">
+                <a:latin typeface="Arial"/>
+                <a:cs typeface="Arial"/>
+              </a:rPr>
+              <a:t>of</a:t>
+            </a:r>
+            <a:r>
+              <a:rPr lang="zh-Hans" altLang="en-US" sz="2160" dirty="0">
+                <a:latin typeface="Arial"/>
+                <a:cs typeface="Arial"/>
+              </a:rPr>
+              <a:t> </a:t>
+            </a:r>
+            <a:r>
+              <a:rPr lang="en-US" altLang="zh-Hans" sz="2160" dirty="0">
+                <a:latin typeface="Arial"/>
+                <a:cs typeface="Arial"/>
+              </a:rPr>
+              <a:t>our</a:t>
+            </a:r>
+            <a:r>
+              <a:rPr lang="zh-Hans" altLang="en-US" sz="2160" dirty="0">
+                <a:latin typeface="Arial"/>
+                <a:cs typeface="Arial"/>
+              </a:rPr>
+              <a:t> </a:t>
+            </a:r>
+            <a:r>
+              <a:rPr lang="en-US" altLang="zh-Hans" sz="2160" dirty="0">
+                <a:latin typeface="Arial"/>
+                <a:cs typeface="Arial"/>
+              </a:rPr>
+              <a:t>model.</a:t>
+            </a:r>
+            <a:r>
+              <a:rPr lang="zh-Hans" altLang="en-US" sz="2160" dirty="0">
+                <a:latin typeface="Arial"/>
+                <a:cs typeface="Arial"/>
+              </a:rPr>
+              <a:t> </a:t>
+            </a:r>
+            <a:r>
+              <a:rPr lang="en-US" altLang="zh-Hans" sz="2160" dirty="0">
+                <a:latin typeface="Arial"/>
+                <a:cs typeface="Arial"/>
+              </a:rPr>
+              <a:t>The first row are original unstripped images. And second row are learned stripped images. As shown in those images, our algorithm can perform skull stripping well on various slices of brains. The overall accuracy of our model is around 92%. One thing worth noting is that most of our model‘s inaccuracy comes from failing to strip a small portion of skull, As shown in figure 7.</a:t>
+            </a:r>
+            <a:r>
+              <a:rPr lang="zh-Hans" altLang="en-US" sz="2160" dirty="0">
+                <a:latin typeface="Arial"/>
+                <a:cs typeface="Arial"/>
+              </a:rPr>
+              <a:t> </a:t>
+            </a:r>
+            <a:r>
+              <a:rPr lang="en-US" altLang="zh-Hans" sz="2160" dirty="0">
+                <a:latin typeface="Arial"/>
+                <a:cs typeface="Arial"/>
+              </a:rPr>
+              <a:t>The core brain parts remain intact, which is desirable for skull stripping.</a:t>
+            </a:r>
+            <a:endParaRPr lang="en-US" sz="2160" dirty="0">
+              <a:latin typeface="Arial"/>
+              <a:cs typeface="Arial"/>
+            </a:endParaRPr>
+          </a:p>
+          <a:p>
+            <a:endParaRPr lang="en-US" sz="2160" dirty="0">
+              <a:latin typeface="Arial"/>
+              <a:cs typeface="Arial"/>
+            </a:endParaRPr>
+          </a:p>
+          <a:p>
+            <a:pPr marL="342900" indent="-342900">
+              <a:buFont typeface="Arial" panose="020B0604020202020204" pitchFamily="34" charset="0"/>
+              <a:buChar char="•"/>
+            </a:pPr>
+            <a:endParaRPr lang="en-US" sz="2160" dirty="0">
+              <a:latin typeface="Arial"/>
+              <a:cs typeface="Arial"/>
+            </a:endParaRPr>
+          </a:p>
+          <a:p>
+            <a:endParaRPr lang="en-US" sz="2160" dirty="0">
+              <a:latin typeface="Arial"/>
+              <a:cs typeface="Arial"/>
+            </a:endParaRPr>
+          </a:p>
+          <a:p>
+            <a:endParaRPr lang="en-US" sz="2160" dirty="0">
+              <a:latin typeface="Arial"/>
+              <a:cs typeface="Arial"/>
+            </a:endParaRPr>
+          </a:p>
+          <a:p>
+            <a:endParaRPr lang="en-US" sz="2160" dirty="0">
+              <a:latin typeface="Arial"/>
+              <a:cs typeface="Arial"/>
+            </a:endParaRPr>
+          </a:p>
+          <a:p>
+            <a:endParaRPr lang="en-US" sz="2160" dirty="0">
+              <a:latin typeface="Arial"/>
+              <a:cs typeface="Arial"/>
+            </a:endParaRPr>
+          </a:p>
+          <a:p>
+            <a:endParaRPr lang="en-US" sz="2160" dirty="0">
+              <a:latin typeface="Arial"/>
+              <a:cs typeface="Arial"/>
+            </a:endParaRPr>
+          </a:p>
+          <a:p>
+            <a:endParaRPr lang="en-US" sz="2160" dirty="0">
+              <a:latin typeface="Arial"/>
+              <a:cs typeface="Arial"/>
+            </a:endParaRPr>
+          </a:p>
+          <a:p>
+            <a:endParaRPr lang="en-US" sz="2160" dirty="0">
+              <a:latin typeface="Arial"/>
+              <a:cs typeface="Arial"/>
+            </a:endParaRPr>
+          </a:p>
+          <a:p>
+            <a:endParaRPr lang="en-US" sz="2160" dirty="0">
+              <a:latin typeface="Arial"/>
+              <a:cs typeface="Arial"/>
+            </a:endParaRPr>
+          </a:p>
+          <a:p>
+            <a:endParaRPr lang="en-US" sz="2160" dirty="0">
+              <a:latin typeface="Arial"/>
+              <a:cs typeface="Arial"/>
+            </a:endParaRPr>
+          </a:p>
+          <a:p>
+            <a:endParaRPr lang="en-US" sz="2160" dirty="0">
+              <a:latin typeface="Arial"/>
+              <a:cs typeface="Arial"/>
+            </a:endParaRPr>
+          </a:p>
+          <a:p>
+            <a:r>
+              <a:rPr lang="en-US" sz="2160" dirty="0">
+                <a:latin typeface="Arial"/>
+                <a:cs typeface="Arial"/>
+              </a:rPr>
+              <a:t>                  </a:t>
+            </a:r>
+          </a:p>
+          <a:p>
             <a:r>
               <a:rPr lang="en-US" sz="4320" b="1" dirty="0">
                 <a:solidFill>
@@ -1364,54 +2746,149 @@
                 <a:latin typeface="Arial"/>
                 <a:cs typeface="Arial"/>
               </a:rPr>
-              <a:t>Results</a:t>
-            </a:r>
-            <a:endParaRPr lang="en-US" sz="4320" dirty="0">
+              <a:t>Conclusion</a:t>
+            </a:r>
+          </a:p>
+          <a:p>
+            <a:endParaRPr lang="en-US" sz="1681" b="1" dirty="0">
+              <a:solidFill>
+                <a:srgbClr val="2D669D"/>
+              </a:solidFill>
               <a:latin typeface="Arial"/>
               <a:cs typeface="Arial"/>
             </a:endParaRPr>
           </a:p>
           <a:p>
-            <a:endParaRPr lang="en-US" sz="2401" dirty="0"/>
-          </a:p>
-          <a:p>
-            <a:pPr marL="411440" indent="-411440" algn="just">
+            <a:pPr marL="342864" indent="-342864" algn="just">
               <a:buFont typeface="Arial" panose="020B0604020202020204" pitchFamily="34" charset="0"/>
               <a:buChar char="•"/>
             </a:pPr>
             <a:r>
-              <a:rPr lang="en-US" sz="2401" dirty="0" err="1"/>
-              <a:t>PerfAngio</a:t>
-            </a:r>
-            <a:r>
-              <a:rPr lang="en-US" sz="2401" dirty="0"/>
-              <a:t>  provides unique insights into visualization of features never seen before on DSA. It has been successfully used to retrospectively analyze multi-center datasets. The software demonstrates  feasibility and performance to evaluate angiographic outcome in the multicenter trial TREVO2. It was also a useful tool to compare the impact of devices during </a:t>
-            </a:r>
-            <a:r>
-              <a:rPr lang="en-US" sz="2401" dirty="0" err="1"/>
-              <a:t>thrombectomy</a:t>
-            </a:r>
-            <a:r>
-              <a:rPr lang="en-US" sz="2401" dirty="0"/>
-              <a:t> and the hemodynamic impact of stenting in SAMMPRIS. </a:t>
-            </a:r>
-          </a:p>
-          <a:p>
-            <a:pPr marL="411440" indent="-411440" algn="just">
-              <a:buFont typeface="Arial" panose="020B0604020202020204" pitchFamily="34" charset="0"/>
+              <a:rPr lang="en-US" sz="2160" dirty="0"/>
+              <a:t>This innovative imaging software can provide insights into Stroke from standard DSA. It is particularly promising for retrospective studies and during clot-retrieval interventions as it offers an objective, continuous measure to characterize angiographic observations.</a:t>
+            </a:r>
+          </a:p>
+          <a:p>
+            <a:endParaRPr lang="en-US" sz="2160" dirty="0"/>
+          </a:p>
+          <a:p>
+            <a:r>
+              <a:rPr lang="en-US" sz="4320" b="1" dirty="0">
+                <a:solidFill>
+                  <a:srgbClr val="2D669D"/>
+                </a:solidFill>
+                <a:latin typeface="Arial"/>
+                <a:cs typeface="Arial"/>
+              </a:rPr>
+              <a:t>References</a:t>
+            </a:r>
+          </a:p>
+          <a:p>
+            <a:endParaRPr lang="en-US" sz="1681" b="1" dirty="0">
+              <a:solidFill>
+                <a:srgbClr val="2D669D"/>
+              </a:solidFill>
+              <a:latin typeface="Arial"/>
+              <a:cs typeface="Arial"/>
+            </a:endParaRPr>
+          </a:p>
+          <a:p>
+            <a:pPr marL="411440" indent="-411440">
+              <a:buFont typeface="Arial"/>
               <a:buChar char="•"/>
             </a:pPr>
             <a:r>
-              <a:rPr lang="en-US" sz="2401" dirty="0"/>
-              <a:t>Several ongoing research projects at UCLA are currently using </a:t>
-            </a:r>
-            <a:r>
-              <a:rPr lang="en-US" sz="2401" dirty="0" err="1"/>
-              <a:t>PerfAngio</a:t>
-            </a:r>
-            <a:r>
-              <a:rPr lang="en-US" sz="2401" dirty="0"/>
-              <a:t> to study several questions related to acute Stroke therapy, including identification of futile recanalization, detection of hemorrhagic transformation, correlation with MRI and CT and automatic quantification of reperfusion and collateral flow.</a:t>
+              <a:rPr lang="en-US" sz="2160" dirty="0"/>
+              <a:t>D. Liebeskind, F. </a:t>
+            </a:r>
+            <a:r>
+              <a:rPr lang="en-US" sz="2160" dirty="0" err="1"/>
+              <a:t>Scalzo</a:t>
+            </a:r>
+            <a:r>
+              <a:rPr lang="en-US" sz="2160" dirty="0"/>
+              <a:t>, N. </a:t>
+            </a:r>
+            <a:r>
+              <a:rPr lang="en-US" sz="2160" dirty="0" err="1"/>
+              <a:t>Sanossian</a:t>
+            </a:r>
+            <a:r>
+              <a:rPr lang="en-US" sz="2160" dirty="0"/>
+              <a:t>, R. Gupta, T. </a:t>
+            </a:r>
+            <a:r>
+              <a:rPr lang="en-US" sz="2160" dirty="0" err="1"/>
+              <a:t>Jovin</a:t>
+            </a:r>
+            <a:r>
+              <a:rPr lang="en-US" sz="2160" dirty="0"/>
+              <a:t>, G. Walker, G. Albers, H. </a:t>
+            </a:r>
+            <a:r>
+              <a:rPr lang="en-US" sz="2160" dirty="0" err="1"/>
+              <a:t>Lutsep</a:t>
+            </a:r>
+            <a:r>
+              <a:rPr lang="en-US" sz="2160" dirty="0"/>
+              <a:t>, W. Smith, R. </a:t>
+            </a:r>
+            <a:r>
+              <a:rPr lang="en-US" sz="2160" dirty="0" err="1"/>
+              <a:t>Nogueira</a:t>
+            </a:r>
+            <a:r>
+              <a:rPr lang="en-US" sz="2160" dirty="0"/>
+              <a:t>. </a:t>
+            </a:r>
+            <a:r>
+              <a:rPr lang="en-US" sz="2160" b="1" dirty="0"/>
+              <a:t>Perfusion Angiography in TREVO2</a:t>
+            </a:r>
+            <a:r>
+              <a:rPr lang="en-US" sz="2160" dirty="0"/>
+              <a:t>: </a:t>
+            </a:r>
+            <a:r>
+              <a:rPr lang="en-US" sz="2160" b="1" dirty="0"/>
+              <a:t>Quantitative Reperfusion After Endovascular Therapy in Acute Stroke. </a:t>
+            </a:r>
+            <a:r>
+              <a:rPr lang="en-US" sz="2160" i="1" dirty="0"/>
+              <a:t>Stroke.2013; 44: AWP39.</a:t>
+            </a:r>
+          </a:p>
+          <a:p>
+            <a:endParaRPr lang="en-US" sz="2160" i="1" dirty="0"/>
+          </a:p>
+          <a:p>
+            <a:pPr marL="411440" indent="-411440">
+              <a:buFont typeface="Arial"/>
+              <a:buChar char="•"/>
+            </a:pPr>
+            <a:r>
+              <a:rPr lang="en-US" sz="2160" dirty="0"/>
+              <a:t>D. Liebeskind, G. </a:t>
+            </a:r>
+            <a:r>
+              <a:rPr lang="en-US" sz="2160" dirty="0" err="1"/>
+              <a:t>Szilagyi</a:t>
+            </a:r>
+            <a:r>
+              <a:rPr lang="en-US" sz="2160" dirty="0"/>
+              <a:t>, S. Black , B. Buck</a:t>
+            </a:r>
+            <a:r>
+              <a:rPr lang="en-US" sz="2160" b="1" dirty="0"/>
+              <a:t>. Perfusion Angiography: a novel technique for characterization of perfusion in cerebral ischemia</a:t>
+            </a:r>
+            <a:r>
+              <a:rPr lang="en-US" sz="2160" dirty="0"/>
+              <a:t>. </a:t>
+            </a:r>
+            <a:r>
+              <a:rPr lang="en-US" sz="2160" i="1" dirty="0"/>
+              <a:t>Stroke.2008,39:576.</a:t>
             </a:r>
           </a:p>
           <a:p>
@@ -1426,435 +2903,6 @@
           </a:p>
         </p:txBody>
       </p:sp>
-      <p:sp>
-        <p:nvSpPr>
-          <p:cNvPr id="9" name="TextBox 8"/>
-          <p:cNvSpPr txBox="1"/>
-          <p:nvPr/>
-        </p:nvSpPr>
-        <p:spPr>
-          <a:xfrm>
-            <a:off x="22772126" y="7500158"/>
-            <a:ext cx="9052560" cy="11552957"/>
-          </a:xfrm>
-          <a:prstGeom prst="rect">
-            <a:avLst/>
-          </a:prstGeom>
-          <a:noFill/>
-        </p:spPr>
-        <p:txBody>
-          <a:bodyPr wrap="square" lIns="65837" tIns="32918" rIns="65837" bIns="32918" rtlCol="0">
-            <a:spAutoFit/>
-          </a:bodyPr>
-          <a:lstStyle/>
-          <a:p>
-            <a:endParaRPr lang="en-US" sz="2160" dirty="0">
-              <a:latin typeface="Arial"/>
-              <a:cs typeface="Arial"/>
-            </a:endParaRPr>
-          </a:p>
-          <a:p>
-            <a:r>
-              <a:rPr lang="en-US" sz="2160" dirty="0">
-                <a:latin typeface="Arial"/>
-                <a:cs typeface="Arial"/>
-              </a:rPr>
-              <a:t>              </a:t>
-            </a:r>
-          </a:p>
-          <a:p>
-            <a:endParaRPr lang="en-US" sz="2160" dirty="0">
-              <a:latin typeface="Arial"/>
-              <a:cs typeface="Arial"/>
-            </a:endParaRPr>
-          </a:p>
-          <a:p>
-            <a:endParaRPr lang="en-US" sz="2160" dirty="0">
-              <a:latin typeface="Arial"/>
-              <a:cs typeface="Arial"/>
-            </a:endParaRPr>
-          </a:p>
-          <a:p>
-            <a:endParaRPr lang="en-US" sz="2160" dirty="0">
-              <a:latin typeface="Arial"/>
-              <a:cs typeface="Arial"/>
-            </a:endParaRPr>
-          </a:p>
-          <a:p>
-            <a:endParaRPr lang="en-US" sz="2160" dirty="0">
-              <a:latin typeface="Arial"/>
-              <a:cs typeface="Arial"/>
-            </a:endParaRPr>
-          </a:p>
-          <a:p>
-            <a:endParaRPr lang="en-US" sz="2160" dirty="0">
-              <a:latin typeface="Arial"/>
-              <a:cs typeface="Arial"/>
-            </a:endParaRPr>
-          </a:p>
-          <a:p>
-            <a:endParaRPr lang="en-US" sz="2160" dirty="0">
-              <a:latin typeface="Arial"/>
-              <a:cs typeface="Arial"/>
-            </a:endParaRPr>
-          </a:p>
-          <a:p>
-            <a:endParaRPr lang="en-US" sz="2160" dirty="0">
-              <a:latin typeface="Arial"/>
-              <a:cs typeface="Arial"/>
-            </a:endParaRPr>
-          </a:p>
-          <a:p>
-            <a:endParaRPr lang="en-US" sz="2160" dirty="0">
-              <a:latin typeface="Arial"/>
-              <a:cs typeface="Arial"/>
-            </a:endParaRPr>
-          </a:p>
-          <a:p>
-            <a:endParaRPr lang="en-US" sz="2160" dirty="0">
-              <a:latin typeface="Arial"/>
-              <a:cs typeface="Arial"/>
-            </a:endParaRPr>
-          </a:p>
-          <a:p>
-            <a:endParaRPr lang="en-US" sz="2160" dirty="0">
-              <a:latin typeface="Arial"/>
-              <a:cs typeface="Arial"/>
-            </a:endParaRPr>
-          </a:p>
-          <a:p>
-            <a:endParaRPr lang="en-US" sz="2160" dirty="0">
-              <a:latin typeface="Arial"/>
-              <a:cs typeface="Arial"/>
-            </a:endParaRPr>
-          </a:p>
-          <a:p>
-            <a:endParaRPr lang="en-US" sz="2160" dirty="0">
-              <a:latin typeface="Arial"/>
-              <a:cs typeface="Arial"/>
-            </a:endParaRPr>
-          </a:p>
-          <a:p>
-            <a:r>
-              <a:rPr lang="en-US" sz="2160" dirty="0">
-                <a:latin typeface="Arial"/>
-                <a:cs typeface="Arial"/>
-              </a:rPr>
-              <a:t>                  </a:t>
-            </a:r>
-          </a:p>
-          <a:p>
-            <a:r>
-              <a:rPr lang="en-US" sz="4320" b="1" dirty="0">
-                <a:solidFill>
-                  <a:srgbClr val="2D669D"/>
-                </a:solidFill>
-                <a:latin typeface="Arial"/>
-                <a:cs typeface="Arial"/>
-              </a:rPr>
-              <a:t>Conclusion</a:t>
-            </a:r>
-          </a:p>
-          <a:p>
-            <a:endParaRPr lang="en-US" sz="1681" b="1" dirty="0">
-              <a:solidFill>
-                <a:srgbClr val="2D669D"/>
-              </a:solidFill>
-              <a:latin typeface="Arial"/>
-              <a:cs typeface="Arial"/>
-            </a:endParaRPr>
-          </a:p>
-          <a:p>
-            <a:pPr marL="342864" indent="-342864" algn="just">
-              <a:buFont typeface="Arial" panose="020B0604020202020204" pitchFamily="34" charset="0"/>
-              <a:buChar char="•"/>
-            </a:pPr>
-            <a:r>
-              <a:rPr lang="en-US" sz="2160" dirty="0"/>
-              <a:t>This innovative imaging software can provide insights into Stroke from standard DSA. It is particularly promising for retrospective studies and during clot-retrieval interventions as it offers an objective, continuous measure to characterize angiographic observations.</a:t>
-            </a:r>
-          </a:p>
-          <a:p>
-            <a:endParaRPr lang="en-US" sz="2160" dirty="0"/>
-          </a:p>
-          <a:p>
-            <a:r>
-              <a:rPr lang="en-US" sz="4320" b="1" dirty="0">
-                <a:solidFill>
-                  <a:srgbClr val="2D669D"/>
-                </a:solidFill>
-                <a:latin typeface="Arial"/>
-                <a:cs typeface="Arial"/>
-              </a:rPr>
-              <a:t>References</a:t>
-            </a:r>
-          </a:p>
-          <a:p>
-            <a:endParaRPr lang="en-US" sz="1681" b="1" dirty="0">
-              <a:solidFill>
-                <a:srgbClr val="2D669D"/>
-              </a:solidFill>
-              <a:latin typeface="Arial"/>
-              <a:cs typeface="Arial"/>
-            </a:endParaRPr>
-          </a:p>
-          <a:p>
-            <a:pPr marL="411440" indent="-411440">
-              <a:buFont typeface="Arial"/>
-              <a:buChar char="•"/>
-            </a:pPr>
-            <a:r>
-              <a:rPr lang="en-US" sz="2160" dirty="0"/>
-              <a:t>D. Liebeskind, F. </a:t>
-            </a:r>
-            <a:r>
-              <a:rPr lang="en-US" sz="2160" dirty="0" err="1"/>
-              <a:t>Scalzo</a:t>
-            </a:r>
-            <a:r>
-              <a:rPr lang="en-US" sz="2160" dirty="0"/>
-              <a:t>, N. </a:t>
-            </a:r>
-            <a:r>
-              <a:rPr lang="en-US" sz="2160" dirty="0" err="1"/>
-              <a:t>Sanossian</a:t>
-            </a:r>
-            <a:r>
-              <a:rPr lang="en-US" sz="2160" dirty="0"/>
-              <a:t>, R. Gupta, T. </a:t>
-            </a:r>
-            <a:r>
-              <a:rPr lang="en-US" sz="2160" dirty="0" err="1"/>
-              <a:t>Jovin</a:t>
-            </a:r>
-            <a:r>
-              <a:rPr lang="en-US" sz="2160" dirty="0"/>
-              <a:t>, G. Walker, G. Albers, H. </a:t>
-            </a:r>
-            <a:r>
-              <a:rPr lang="en-US" sz="2160" dirty="0" err="1"/>
-              <a:t>Lutsep</a:t>
-            </a:r>
-            <a:r>
-              <a:rPr lang="en-US" sz="2160" dirty="0"/>
-              <a:t>, W. Smith, R. </a:t>
-            </a:r>
-            <a:r>
-              <a:rPr lang="en-US" sz="2160" dirty="0" err="1"/>
-              <a:t>Nogueira</a:t>
-            </a:r>
-            <a:r>
-              <a:rPr lang="en-US" sz="2160" dirty="0"/>
-              <a:t>. </a:t>
-            </a:r>
-            <a:r>
-              <a:rPr lang="en-US" sz="2160" b="1" dirty="0"/>
-              <a:t>Perfusion Angiography in TREVO2</a:t>
-            </a:r>
-            <a:r>
-              <a:rPr lang="en-US" sz="2160" dirty="0"/>
-              <a:t>: </a:t>
-            </a:r>
-            <a:r>
-              <a:rPr lang="en-US" sz="2160" b="1" dirty="0"/>
-              <a:t>Quantitative Reperfusion After Endovascular Therapy in Acute Stroke. </a:t>
-            </a:r>
-            <a:r>
-              <a:rPr lang="en-US" sz="2160" i="1" dirty="0"/>
-              <a:t>Stroke.2013; 44: AWP39.</a:t>
-            </a:r>
-          </a:p>
-          <a:p>
-            <a:endParaRPr lang="en-US" sz="2160" i="1" dirty="0"/>
-          </a:p>
-          <a:p>
-            <a:pPr marL="411440" indent="-411440">
-              <a:buFont typeface="Arial"/>
-              <a:buChar char="•"/>
-            </a:pPr>
-            <a:r>
-              <a:rPr lang="en-US" sz="2160" dirty="0"/>
-              <a:t>D. Liebeskind, G. </a:t>
-            </a:r>
-            <a:r>
-              <a:rPr lang="en-US" sz="2160" dirty="0" err="1"/>
-              <a:t>Szilagyi</a:t>
-            </a:r>
-            <a:r>
-              <a:rPr lang="en-US" sz="2160" dirty="0"/>
-              <a:t>, S. Black , B. Buck</a:t>
-            </a:r>
-            <a:r>
-              <a:rPr lang="en-US" sz="2160" b="1" dirty="0"/>
-              <a:t>. Perfusion Angiography: a novel technique for characterization of perfusion in cerebral ischemia</a:t>
-            </a:r>
-            <a:r>
-              <a:rPr lang="en-US" sz="2160" dirty="0"/>
-              <a:t>. </a:t>
-            </a:r>
-            <a:r>
-              <a:rPr lang="en-US" sz="2160" i="1" dirty="0"/>
-              <a:t>Stroke.2008,39:576.</a:t>
-            </a:r>
-          </a:p>
-          <a:p>
-            <a:pPr marL="411440" indent="-411440">
-              <a:buFont typeface="Arial"/>
-              <a:buChar char="•"/>
-            </a:pPr>
-            <a:endParaRPr lang="en-US" sz="2160" dirty="0">
-              <a:latin typeface="Arial"/>
-              <a:cs typeface="Arial"/>
-            </a:endParaRPr>
-          </a:p>
-        </p:txBody>
-      </p:sp>
-      <p:sp>
-        <p:nvSpPr>
-          <p:cNvPr id="16" name="TextBox 15"/>
-          <p:cNvSpPr txBox="1"/>
-          <p:nvPr/>
-        </p:nvSpPr>
-        <p:spPr>
-          <a:xfrm>
-            <a:off x="11881573" y="16850276"/>
-            <a:ext cx="9577703" cy="1754326"/>
-          </a:xfrm>
-          <a:prstGeom prst="rect">
-            <a:avLst/>
-          </a:prstGeom>
-          <a:noFill/>
-        </p:spPr>
-        <p:txBody>
-          <a:bodyPr wrap="square" rtlCol="0">
-            <a:spAutoFit/>
-          </a:bodyPr>
-          <a:lstStyle/>
-          <a:p>
-            <a:pPr algn="just"/>
-            <a:r>
-              <a:rPr lang="en-US" sz="2160" i="1" dirty="0">
-                <a:solidFill>
-                  <a:srgbClr val="8C8C83"/>
-                </a:solidFill>
-                <a:cs typeface="Arial"/>
-              </a:rPr>
-              <a:t>Figure 1. Illustration of perfusion angiography applied to a DSA run obtained from a patient with acute ischemic stroke (after successful MCA m1 recanalization). </a:t>
-            </a:r>
-          </a:p>
-          <a:p>
-            <a:pPr algn="just"/>
-            <a:r>
-              <a:rPr lang="en-US" sz="2160" i="1" dirty="0">
-                <a:solidFill>
-                  <a:srgbClr val="8C8C83"/>
-                </a:solidFill>
-                <a:cs typeface="Arial"/>
-              </a:rPr>
-              <a:t>The DSA run, whose subset of images is shown in the upper row, is used to compute CBV, CBF, MTT, TTP, and </a:t>
-            </a:r>
-            <a:r>
-              <a:rPr lang="en-US" sz="2160" i="1" dirty="0" err="1">
-                <a:solidFill>
-                  <a:srgbClr val="8C8C83"/>
-                </a:solidFill>
-                <a:cs typeface="Arial"/>
-              </a:rPr>
-              <a:t>Tmax</a:t>
-            </a:r>
-            <a:r>
-              <a:rPr lang="en-US" sz="2160" i="1" dirty="0">
-                <a:solidFill>
-                  <a:srgbClr val="8C8C83"/>
-                </a:solidFill>
-                <a:cs typeface="Arial"/>
-              </a:rPr>
-              <a:t>. Results are normalized to match a color-scale. </a:t>
-            </a:r>
-          </a:p>
-          <a:p>
-            <a:pPr algn="just"/>
-            <a:r>
-              <a:rPr lang="en-US" sz="2160" i="1" dirty="0" err="1">
-                <a:solidFill>
-                  <a:srgbClr val="8C8C83"/>
-                </a:solidFill>
-                <a:cs typeface="Arial"/>
-              </a:rPr>
-              <a:t>Tmax</a:t>
-            </a:r>
-            <a:r>
-              <a:rPr lang="en-US" sz="2160" i="1" dirty="0">
-                <a:solidFill>
-                  <a:srgbClr val="8C8C83"/>
-                </a:solidFill>
-                <a:cs typeface="Arial"/>
-              </a:rPr>
-              <a:t> &gt; 6 sec is shown in red.</a:t>
-            </a:r>
-          </a:p>
-        </p:txBody>
-      </p:sp>
-      <p:pic>
-        <p:nvPicPr>
-          <p:cNvPr id="1027" name="Picture 3"/>
-          <p:cNvPicPr>
-            <a:picLocks noChangeAspect="1" noChangeArrowheads="1"/>
-          </p:cNvPicPr>
-          <p:nvPr/>
-        </p:nvPicPr>
-        <p:blipFill>
-          <a:blip r:embed="rId3">
-            <a:extLst>
-              <a:ext uri="{28A0092B-C50C-407E-A947-70E740481C1C}">
-                <a14:useLocalDpi xmlns:a14="http://schemas.microsoft.com/office/drawing/2010/main" val="0"/>
-              </a:ext>
-            </a:extLst>
-          </a:blip>
-          <a:srcRect/>
-          <a:stretch>
-            <a:fillRect/>
-          </a:stretch>
-        </p:blipFill>
-        <p:spPr bwMode="auto">
-          <a:xfrm>
-            <a:off x="11881570" y="12488680"/>
-            <a:ext cx="9577706" cy="3922027"/>
-          </a:xfrm>
-          <a:prstGeom prst="rect">
-            <a:avLst/>
-          </a:prstGeom>
-          <a:ln>
-            <a:noFill/>
-          </a:ln>
-          <a:effectLst>
-            <a:outerShdw blurRad="292100" dist="139700" dir="2700000" algn="tl" rotWithShape="0">
-              <a:srgbClr val="333333">
-                <a:alpha val="65000"/>
-              </a:srgbClr>
-            </a:outerShdw>
-          </a:effectLst>
-          <a:extLst>
-            <a:ext uri="{909E8E84-426E-40DD-AFC4-6F175D3DCCD1}">
-              <a14:hiddenFill xmlns:a14="http://schemas.microsoft.com/office/drawing/2010/main">
-                <a:solidFill>
-                  <a:schemeClr val="accent1"/>
-                </a:solidFill>
-              </a14:hiddenFill>
-            </a:ext>
-            <a:ext uri="{91240B29-F687-4F45-9708-019B960494DF}">
-              <a14:hiddenLine xmlns:a14="http://schemas.microsoft.com/office/drawing/2010/main" w="9525">
-                <a:solidFill>
-                  <a:schemeClr val="tx1"/>
-                </a:solidFill>
-                <a:miter lim="800000"/>
-                <a:headEnd/>
-                <a:tailEnd/>
-              </a14:hiddenLine>
-            </a:ext>
-          </a:extLst>
-        </p:spPr>
-      </p:pic>
       <p:sp>
         <p:nvSpPr>
           <p:cNvPr id="27" name="Rectangle 26"/>
@@ -1897,30 +2945,6 @@
           </a:p>
         </p:txBody>
       </p:sp>
-      <p:pic>
-        <p:nvPicPr>
-          <p:cNvPr id="8" name="Picture 7"/>
-          <p:cNvPicPr>
-            <a:picLocks noChangeAspect="1"/>
-          </p:cNvPicPr>
-          <p:nvPr/>
-        </p:nvPicPr>
-        <p:blipFill>
-          <a:blip r:embed="rId4"/>
-          <a:stretch>
-            <a:fillRect/>
-          </a:stretch>
-        </p:blipFill>
-        <p:spPr>
-          <a:xfrm>
-            <a:off x="25005470" y="4469424"/>
-            <a:ext cx="4585872" cy="6470642"/>
-          </a:xfrm>
-          <a:prstGeom prst="rect">
-            <a:avLst/>
-          </a:prstGeom>
-        </p:spPr>
-      </p:pic>
       <p:sp>
         <p:nvSpPr>
           <p:cNvPr id="21" name="Rectangle 20"/>
@@ -2020,7 +3044,7 @@
           <p:nvPr/>
         </p:nvPicPr>
         <p:blipFill>
-          <a:blip r:embed="rId5"/>
+          <a:blip r:embed="rId4"/>
           <a:stretch>
             <a:fillRect/>
           </a:stretch>
@@ -2050,7 +3074,7 @@
           <p:nvPr/>
         </p:nvPicPr>
         <p:blipFill>
-          <a:blip r:embed="rId6"/>
+          <a:blip r:embed="rId5"/>
           <a:stretch>
             <a:fillRect/>
           </a:stretch>
@@ -2080,7 +3104,7 @@
           <p:nvPr/>
         </p:nvPicPr>
         <p:blipFill>
-          <a:blip r:embed="rId7"/>
+          <a:blip r:embed="rId6"/>
           <a:stretch>
             <a:fillRect/>
           </a:stretch>
@@ -2130,7 +3154,7 @@
             <p:nvPr/>
           </p:nvPicPr>
           <p:blipFill>
-            <a:blip r:embed="rId8"/>
+            <a:blip r:embed="rId7"/>
             <a:stretch>
               <a:fillRect/>
             </a:stretch>
@@ -2160,7 +3184,7 @@
             <p:nvPr/>
           </p:nvPicPr>
           <p:blipFill>
-            <a:blip r:embed="rId9"/>
+            <a:blip r:embed="rId8"/>
             <a:stretch>
               <a:fillRect/>
             </a:stretch>
@@ -2190,7 +3214,7 @@
             <p:nvPr/>
           </p:nvPicPr>
           <p:blipFill>
-            <a:blip r:embed="rId10"/>
+            <a:blip r:embed="rId9"/>
             <a:stretch>
               <a:fillRect/>
             </a:stretch>
@@ -2220,7 +3244,7 @@
             <p:nvPr/>
           </p:nvPicPr>
           <p:blipFill>
-            <a:blip r:embed="rId11"/>
+            <a:blip r:embed="rId10"/>
             <a:stretch>
               <a:fillRect/>
             </a:stretch>
@@ -2298,6 +3322,941 @@
           </a:p>
         </p:txBody>
       </p:sp>
+      <p:sp>
+        <p:nvSpPr>
+          <p:cNvPr id="13" name="TextBox 12">
+            <a:extLst>
+              <a:ext uri="{FF2B5EF4-FFF2-40B4-BE49-F238E27FC236}">
+                <a16:creationId xmlns:a16="http://schemas.microsoft.com/office/drawing/2014/main" id="{DEB77006-C22B-594B-95D2-E37F33298B5E}"/>
+              </a:ext>
+            </a:extLst>
+          </p:cNvPr>
+          <p:cNvSpPr txBox="1"/>
+          <p:nvPr/>
+        </p:nvSpPr>
+        <p:spPr>
+          <a:xfrm>
+            <a:off x="8231133" y="13865479"/>
+            <a:ext cx="643125" cy="584775"/>
+          </a:xfrm>
+          <a:prstGeom prst="rect">
+            <a:avLst/>
+          </a:prstGeom>
+          <a:noFill/>
+        </p:spPr>
+        <p:txBody>
+          <a:bodyPr wrap="none" rtlCol="0">
+            <a:spAutoFit/>
+          </a:bodyPr>
+          <a:lstStyle/>
+          <a:p>
+            <a:r>
+              <a:rPr lang="en-US" altLang="zh-Hans" sz="3200" dirty="0">
+                <a:cs typeface="Arial" panose="020B0604020202020204" pitchFamily="34" charset="0"/>
+              </a:rPr>
+              <a:t>(1)</a:t>
+            </a:r>
+            <a:endParaRPr lang="en-US" sz="3200" dirty="0">
+              <a:cs typeface="Arial" panose="020B0604020202020204" pitchFamily="34" charset="0"/>
+            </a:endParaRPr>
+          </a:p>
+        </p:txBody>
+      </p:sp>
+      <p:pic>
+        <p:nvPicPr>
+          <p:cNvPr id="20" name="Picture 19">
+            <a:extLst>
+              <a:ext uri="{FF2B5EF4-FFF2-40B4-BE49-F238E27FC236}">
+                <a16:creationId xmlns:a16="http://schemas.microsoft.com/office/drawing/2014/main" id="{FD609D13-2611-6B45-84D4-17A1D0E1A129}"/>
+              </a:ext>
+            </a:extLst>
+          </p:cNvPr>
+          <p:cNvPicPr>
+            <a:picLocks noChangeAspect="1"/>
+          </p:cNvPicPr>
+          <p:nvPr/>
+        </p:nvPicPr>
+        <p:blipFill>
+          <a:blip r:embed="rId11"/>
+          <a:stretch>
+            <a:fillRect/>
+          </a:stretch>
+        </p:blipFill>
+        <p:spPr>
+          <a:xfrm>
+            <a:off x="17123279" y="8859625"/>
+            <a:ext cx="3901524" cy="2258656"/>
+          </a:xfrm>
+          <a:prstGeom prst="rect">
+            <a:avLst/>
+          </a:prstGeom>
+        </p:spPr>
+      </p:pic>
+      <p:sp>
+        <p:nvSpPr>
+          <p:cNvPr id="26" name="TextBox 25">
+            <a:extLst>
+              <a:ext uri="{FF2B5EF4-FFF2-40B4-BE49-F238E27FC236}">
+                <a16:creationId xmlns:a16="http://schemas.microsoft.com/office/drawing/2014/main" id="{E0BE3BEB-E661-C84C-A86E-E44E1C64E9AF}"/>
+              </a:ext>
+            </a:extLst>
+          </p:cNvPr>
+          <p:cNvSpPr txBox="1"/>
+          <p:nvPr/>
+        </p:nvSpPr>
+        <p:spPr>
+          <a:xfrm>
+            <a:off x="17389785" y="11324268"/>
+            <a:ext cx="3449983" cy="424732"/>
+          </a:xfrm>
+          <a:prstGeom prst="rect">
+            <a:avLst/>
+          </a:prstGeom>
+          <a:noFill/>
+        </p:spPr>
+        <p:txBody>
+          <a:bodyPr wrap="none" rtlCol="0">
+            <a:spAutoFit/>
+          </a:bodyPr>
+          <a:lstStyle/>
+          <a:p>
+            <a:r>
+              <a:rPr lang="zh-Hans" altLang="en-US" sz="2160" i="1" dirty="0">
+                <a:solidFill>
+                  <a:srgbClr val="8C8C83"/>
+                </a:solidFill>
+                <a:cs typeface="Arial"/>
+              </a:rPr>
+              <a:t> </a:t>
+            </a:r>
+            <a:r>
+              <a:rPr lang="en-US" sz="2160" i="1" dirty="0">
+                <a:solidFill>
+                  <a:srgbClr val="8C8C83"/>
+                </a:solidFill>
+                <a:cs typeface="Arial"/>
+              </a:rPr>
+              <a:t>Figure </a:t>
+            </a:r>
+            <a:r>
+              <a:rPr lang="en-US" altLang="zh-Hans" sz="2160" i="1" dirty="0">
+                <a:solidFill>
+                  <a:srgbClr val="8C8C83"/>
+                </a:solidFill>
+                <a:cs typeface="Arial"/>
+              </a:rPr>
+              <a:t>4</a:t>
+            </a:r>
+            <a:r>
+              <a:rPr lang="en-US" sz="2160" i="1" dirty="0">
+                <a:solidFill>
+                  <a:srgbClr val="8C8C83"/>
+                </a:solidFill>
+                <a:cs typeface="Arial"/>
+              </a:rPr>
+              <a:t>.</a:t>
+            </a:r>
+            <a:r>
+              <a:rPr lang="zh-Hans" altLang="en-US" sz="2160" i="1" dirty="0">
+                <a:solidFill>
+                  <a:srgbClr val="8C8C83"/>
+                </a:solidFill>
+                <a:cs typeface="Arial"/>
+              </a:rPr>
+              <a:t> </a:t>
+            </a:r>
+            <a:r>
+              <a:rPr lang="en-US" altLang="zh-Hans" sz="2160" i="1" dirty="0">
+                <a:solidFill>
+                  <a:srgbClr val="8C8C83"/>
+                </a:solidFill>
+                <a:cs typeface="Arial"/>
+              </a:rPr>
+              <a:t>loss</a:t>
+            </a:r>
+            <a:r>
+              <a:rPr lang="zh-Hans" altLang="en-US" sz="2160" i="1" dirty="0">
+                <a:solidFill>
+                  <a:srgbClr val="8C8C83"/>
+                </a:solidFill>
+                <a:cs typeface="Arial"/>
+              </a:rPr>
+              <a:t> </a:t>
+            </a:r>
+            <a:r>
+              <a:rPr lang="en-US" altLang="zh-Hans" sz="2160" i="1" dirty="0">
+                <a:solidFill>
+                  <a:srgbClr val="8C8C83"/>
+                </a:solidFill>
+                <a:cs typeface="Arial"/>
+              </a:rPr>
+              <a:t>during</a:t>
+            </a:r>
+            <a:r>
+              <a:rPr lang="zh-Hans" altLang="en-US" sz="2160" i="1" dirty="0">
+                <a:solidFill>
+                  <a:srgbClr val="8C8C83"/>
+                </a:solidFill>
+                <a:cs typeface="Arial"/>
+              </a:rPr>
+              <a:t> </a:t>
+            </a:r>
+            <a:r>
+              <a:rPr lang="en-US" altLang="zh-Hans" sz="2160" i="1" dirty="0">
+                <a:solidFill>
+                  <a:srgbClr val="8C8C83"/>
+                </a:solidFill>
+                <a:cs typeface="Arial"/>
+              </a:rPr>
+              <a:t>training</a:t>
+            </a:r>
+            <a:endParaRPr lang="en-US" sz="2160" dirty="0"/>
+          </a:p>
+        </p:txBody>
+      </p:sp>
+      <p:pic>
+        <p:nvPicPr>
+          <p:cNvPr id="31" name="Picture 30">
+            <a:extLst>
+              <a:ext uri="{FF2B5EF4-FFF2-40B4-BE49-F238E27FC236}">
+                <a16:creationId xmlns:a16="http://schemas.microsoft.com/office/drawing/2014/main" id="{B40C8B9A-3980-1F4B-AF53-3897CEE5AF7F}"/>
+              </a:ext>
+            </a:extLst>
+          </p:cNvPr>
+          <p:cNvPicPr>
+            <a:picLocks noChangeAspect="1"/>
+          </p:cNvPicPr>
+          <p:nvPr/>
+        </p:nvPicPr>
+        <p:blipFill>
+          <a:blip r:embed="rId12"/>
+          <a:stretch>
+            <a:fillRect/>
+          </a:stretch>
+        </p:blipFill>
+        <p:spPr>
+          <a:xfrm>
+            <a:off x="12299025" y="16109078"/>
+            <a:ext cx="1890778" cy="1890778"/>
+          </a:xfrm>
+          <a:prstGeom prst="rect">
+            <a:avLst/>
+          </a:prstGeom>
+        </p:spPr>
+      </p:pic>
+      <p:pic>
+        <p:nvPicPr>
+          <p:cNvPr id="33" name="Picture 32">
+            <a:extLst>
+              <a:ext uri="{FF2B5EF4-FFF2-40B4-BE49-F238E27FC236}">
+                <a16:creationId xmlns:a16="http://schemas.microsoft.com/office/drawing/2014/main" id="{BFE1504D-B2EF-E743-883B-976072A2315F}"/>
+              </a:ext>
+            </a:extLst>
+          </p:cNvPr>
+          <p:cNvPicPr>
+            <a:picLocks noChangeAspect="1"/>
+          </p:cNvPicPr>
+          <p:nvPr/>
+        </p:nvPicPr>
+        <p:blipFill>
+          <a:blip r:embed="rId13"/>
+          <a:stretch>
+            <a:fillRect/>
+          </a:stretch>
+        </p:blipFill>
+        <p:spPr>
+          <a:xfrm>
+            <a:off x="15716013" y="16111810"/>
+            <a:ext cx="1871595" cy="1871595"/>
+          </a:xfrm>
+          <a:prstGeom prst="rect">
+            <a:avLst/>
+          </a:prstGeom>
+        </p:spPr>
+      </p:pic>
+      <p:pic>
+        <p:nvPicPr>
+          <p:cNvPr id="35" name="Picture 34">
+            <a:extLst>
+              <a:ext uri="{FF2B5EF4-FFF2-40B4-BE49-F238E27FC236}">
+                <a16:creationId xmlns:a16="http://schemas.microsoft.com/office/drawing/2014/main" id="{DC712BC4-C681-8941-BB4B-A9DB607C6B5B}"/>
+              </a:ext>
+            </a:extLst>
+          </p:cNvPr>
+          <p:cNvPicPr>
+            <a:picLocks noChangeAspect="1"/>
+          </p:cNvPicPr>
+          <p:nvPr/>
+        </p:nvPicPr>
+        <p:blipFill>
+          <a:blip r:embed="rId14"/>
+          <a:stretch>
+            <a:fillRect/>
+          </a:stretch>
+        </p:blipFill>
+        <p:spPr>
+          <a:xfrm>
+            <a:off x="19088782" y="16076421"/>
+            <a:ext cx="1885269" cy="1885269"/>
+          </a:xfrm>
+          <a:prstGeom prst="rect">
+            <a:avLst/>
+          </a:prstGeom>
+        </p:spPr>
+      </p:pic>
+      <p:sp>
+        <p:nvSpPr>
+          <p:cNvPr id="37" name="TextBox 36">
+            <a:extLst>
+              <a:ext uri="{FF2B5EF4-FFF2-40B4-BE49-F238E27FC236}">
+                <a16:creationId xmlns:a16="http://schemas.microsoft.com/office/drawing/2014/main" id="{355DFA8A-4ED2-F347-B795-8FFB0927793F}"/>
+              </a:ext>
+            </a:extLst>
+          </p:cNvPr>
+          <p:cNvSpPr txBox="1"/>
+          <p:nvPr/>
+        </p:nvSpPr>
+        <p:spPr>
+          <a:xfrm>
+            <a:off x="12047252" y="18096509"/>
+            <a:ext cx="2244525" cy="400110"/>
+          </a:xfrm>
+          <a:prstGeom prst="rect">
+            <a:avLst/>
+          </a:prstGeom>
+          <a:noFill/>
+        </p:spPr>
+        <p:txBody>
+          <a:bodyPr wrap="none" rtlCol="0">
+            <a:spAutoFit/>
+          </a:bodyPr>
+          <a:lstStyle/>
+          <a:p>
+            <a:r>
+              <a:rPr lang="zh-Hans" altLang="en-US" sz="2000" i="1" dirty="0">
+                <a:solidFill>
+                  <a:srgbClr val="8C8C83"/>
+                </a:solidFill>
+                <a:cs typeface="Arial"/>
+              </a:rPr>
+              <a:t> </a:t>
+            </a:r>
+            <a:r>
+              <a:rPr lang="en-US" sz="2000" i="1" dirty="0">
+                <a:solidFill>
+                  <a:srgbClr val="8C8C83"/>
+                </a:solidFill>
+                <a:cs typeface="Arial"/>
+              </a:rPr>
+              <a:t> (a). Original image</a:t>
+            </a:r>
+            <a:endParaRPr lang="en-US" sz="2000" dirty="0"/>
+          </a:p>
+        </p:txBody>
+      </p:sp>
+      <p:sp>
+        <p:nvSpPr>
+          <p:cNvPr id="39" name="Rectangle 38">
+            <a:extLst>
+              <a:ext uri="{FF2B5EF4-FFF2-40B4-BE49-F238E27FC236}">
+                <a16:creationId xmlns:a16="http://schemas.microsoft.com/office/drawing/2014/main" id="{D3F1FCF8-A688-0844-BFCA-5C1BD6A7A5FA}"/>
+              </a:ext>
+            </a:extLst>
+          </p:cNvPr>
+          <p:cNvSpPr/>
+          <p:nvPr/>
+        </p:nvSpPr>
+        <p:spPr>
+          <a:xfrm>
+            <a:off x="15364850" y="18096509"/>
+            <a:ext cx="2719271" cy="400110"/>
+          </a:xfrm>
+          <a:prstGeom prst="rect">
+            <a:avLst/>
+          </a:prstGeom>
+        </p:spPr>
+        <p:txBody>
+          <a:bodyPr wrap="none">
+            <a:spAutoFit/>
+          </a:bodyPr>
+          <a:lstStyle/>
+          <a:p>
+            <a:r>
+              <a:rPr lang="en-US" sz="2000" i="1" dirty="0">
+                <a:solidFill>
+                  <a:srgbClr val="8C8C83"/>
+                </a:solidFill>
+                <a:cs typeface="Arial"/>
+              </a:rPr>
+              <a:t>(b) reconstructed image </a:t>
+            </a:r>
+            <a:endParaRPr lang="en-US" sz="2000" dirty="0"/>
+          </a:p>
+        </p:txBody>
+      </p:sp>
+      <p:sp>
+        <p:nvSpPr>
+          <p:cNvPr id="40" name="Rectangle 39">
+            <a:extLst>
+              <a:ext uri="{FF2B5EF4-FFF2-40B4-BE49-F238E27FC236}">
+                <a16:creationId xmlns:a16="http://schemas.microsoft.com/office/drawing/2014/main" id="{364C7B8E-0116-D64B-A8A8-A40C87C9AB87}"/>
+              </a:ext>
+            </a:extLst>
+          </p:cNvPr>
+          <p:cNvSpPr/>
+          <p:nvPr/>
+        </p:nvSpPr>
+        <p:spPr>
+          <a:xfrm>
+            <a:off x="18542590" y="18092851"/>
+            <a:ext cx="3758793" cy="707886"/>
+          </a:xfrm>
+          <a:prstGeom prst="rect">
+            <a:avLst/>
+          </a:prstGeom>
+        </p:spPr>
+        <p:txBody>
+          <a:bodyPr wrap="square">
+            <a:spAutoFit/>
+          </a:bodyPr>
+          <a:lstStyle/>
+          <a:p>
+            <a:r>
+              <a:rPr lang="en-US" sz="2000" i="1" dirty="0">
+                <a:solidFill>
+                  <a:srgbClr val="8C8C83"/>
+                </a:solidFill>
+                <a:cs typeface="Arial"/>
+              </a:rPr>
+              <a:t>(c) after applying reconstructed image as bitmask to original one </a:t>
+            </a:r>
+            <a:endParaRPr lang="en-US" sz="2000" dirty="0"/>
+          </a:p>
+        </p:txBody>
+      </p:sp>
+      <p:pic>
+        <p:nvPicPr>
+          <p:cNvPr id="1030" name="Picture 1029">
+            <a:extLst>
+              <a:ext uri="{FF2B5EF4-FFF2-40B4-BE49-F238E27FC236}">
+                <a16:creationId xmlns:a16="http://schemas.microsoft.com/office/drawing/2014/main" id="{32A47A34-1454-104A-B152-D8B82E579E31}"/>
+              </a:ext>
+            </a:extLst>
+          </p:cNvPr>
+          <p:cNvPicPr>
+            <a:picLocks noChangeAspect="1"/>
+          </p:cNvPicPr>
+          <p:nvPr/>
+        </p:nvPicPr>
+        <p:blipFill>
+          <a:blip r:embed="rId15"/>
+          <a:stretch>
+            <a:fillRect/>
+          </a:stretch>
+        </p:blipFill>
+        <p:spPr>
+          <a:xfrm>
+            <a:off x="22418371" y="3565123"/>
+            <a:ext cx="1536730" cy="1536730"/>
+          </a:xfrm>
+          <a:prstGeom prst="rect">
+            <a:avLst/>
+          </a:prstGeom>
+        </p:spPr>
+      </p:pic>
+      <p:pic>
+        <p:nvPicPr>
+          <p:cNvPr id="1032" name="Picture 1031">
+            <a:extLst>
+              <a:ext uri="{FF2B5EF4-FFF2-40B4-BE49-F238E27FC236}">
+                <a16:creationId xmlns:a16="http://schemas.microsoft.com/office/drawing/2014/main" id="{8BC2D79C-4319-BA49-ACDE-ABF9D425C2B2}"/>
+              </a:ext>
+            </a:extLst>
+          </p:cNvPr>
+          <p:cNvPicPr>
+            <a:picLocks noChangeAspect="1"/>
+          </p:cNvPicPr>
+          <p:nvPr/>
+        </p:nvPicPr>
+        <p:blipFill>
+          <a:blip r:embed="rId16"/>
+          <a:stretch>
+            <a:fillRect/>
+          </a:stretch>
+        </p:blipFill>
+        <p:spPr>
+          <a:xfrm>
+            <a:off x="24154189" y="3564438"/>
+            <a:ext cx="1537414" cy="1537414"/>
+          </a:xfrm>
+          <a:prstGeom prst="rect">
+            <a:avLst/>
+          </a:prstGeom>
+        </p:spPr>
+      </p:pic>
+      <p:pic>
+        <p:nvPicPr>
+          <p:cNvPr id="1034" name="Picture 1033">
+            <a:extLst>
+              <a:ext uri="{FF2B5EF4-FFF2-40B4-BE49-F238E27FC236}">
+                <a16:creationId xmlns:a16="http://schemas.microsoft.com/office/drawing/2014/main" id="{C85F8023-5719-DF4A-ABE6-9ABD934DF194}"/>
+              </a:ext>
+            </a:extLst>
+          </p:cNvPr>
+          <p:cNvPicPr>
+            <a:picLocks noChangeAspect="1"/>
+          </p:cNvPicPr>
+          <p:nvPr/>
+        </p:nvPicPr>
+        <p:blipFill>
+          <a:blip r:embed="rId17"/>
+          <a:stretch>
+            <a:fillRect/>
+          </a:stretch>
+        </p:blipFill>
+        <p:spPr>
+          <a:xfrm>
+            <a:off x="25902285" y="3544607"/>
+            <a:ext cx="1528805" cy="1528805"/>
+          </a:xfrm>
+          <a:prstGeom prst="rect">
+            <a:avLst/>
+          </a:prstGeom>
+        </p:spPr>
+      </p:pic>
+      <p:pic>
+        <p:nvPicPr>
+          <p:cNvPr id="1036" name="Picture 1035">
+            <a:extLst>
+              <a:ext uri="{FF2B5EF4-FFF2-40B4-BE49-F238E27FC236}">
+                <a16:creationId xmlns:a16="http://schemas.microsoft.com/office/drawing/2014/main" id="{3F8F24F2-B6D7-064D-A759-433CE5044D25}"/>
+              </a:ext>
+            </a:extLst>
+          </p:cNvPr>
+          <p:cNvPicPr>
+            <a:picLocks noChangeAspect="1"/>
+          </p:cNvPicPr>
+          <p:nvPr/>
+        </p:nvPicPr>
+        <p:blipFill>
+          <a:blip r:embed="rId18"/>
+          <a:stretch>
+            <a:fillRect/>
+          </a:stretch>
+        </p:blipFill>
+        <p:spPr>
+          <a:xfrm>
+            <a:off x="27628852" y="3544606"/>
+            <a:ext cx="1528806" cy="1528806"/>
+          </a:xfrm>
+          <a:prstGeom prst="rect">
+            <a:avLst/>
+          </a:prstGeom>
+        </p:spPr>
+      </p:pic>
+      <p:pic>
+        <p:nvPicPr>
+          <p:cNvPr id="1038" name="Picture 1037">
+            <a:extLst>
+              <a:ext uri="{FF2B5EF4-FFF2-40B4-BE49-F238E27FC236}">
+                <a16:creationId xmlns:a16="http://schemas.microsoft.com/office/drawing/2014/main" id="{8F9226D3-8DE9-C34E-8B19-B6B66CFF5C80}"/>
+              </a:ext>
+            </a:extLst>
+          </p:cNvPr>
+          <p:cNvPicPr>
+            <a:picLocks noChangeAspect="1"/>
+          </p:cNvPicPr>
+          <p:nvPr/>
+        </p:nvPicPr>
+        <p:blipFill>
+          <a:blip r:embed="rId19"/>
+          <a:stretch>
+            <a:fillRect/>
+          </a:stretch>
+        </p:blipFill>
+        <p:spPr>
+          <a:xfrm>
+            <a:off x="29378274" y="3549319"/>
+            <a:ext cx="1524093" cy="1524093"/>
+          </a:xfrm>
+          <a:prstGeom prst="rect">
+            <a:avLst/>
+          </a:prstGeom>
+        </p:spPr>
+      </p:pic>
+      <p:pic>
+        <p:nvPicPr>
+          <p:cNvPr id="1040" name="Picture 1039">
+            <a:extLst>
+              <a:ext uri="{FF2B5EF4-FFF2-40B4-BE49-F238E27FC236}">
+                <a16:creationId xmlns:a16="http://schemas.microsoft.com/office/drawing/2014/main" id="{79844E89-C7F3-734F-BDE3-497C93A05109}"/>
+              </a:ext>
+            </a:extLst>
+          </p:cNvPr>
+          <p:cNvPicPr>
+            <a:picLocks noChangeAspect="1"/>
+          </p:cNvPicPr>
+          <p:nvPr/>
+        </p:nvPicPr>
+        <p:blipFill>
+          <a:blip r:embed="rId20"/>
+          <a:stretch>
+            <a:fillRect/>
+          </a:stretch>
+        </p:blipFill>
+        <p:spPr>
+          <a:xfrm>
+            <a:off x="31121814" y="3564747"/>
+            <a:ext cx="1508665" cy="1508665"/>
+          </a:xfrm>
+          <a:prstGeom prst="rect">
+            <a:avLst/>
+          </a:prstGeom>
+        </p:spPr>
+      </p:pic>
+      <p:pic>
+        <p:nvPicPr>
+          <p:cNvPr id="1042" name="Picture 1041">
+            <a:extLst>
+              <a:ext uri="{FF2B5EF4-FFF2-40B4-BE49-F238E27FC236}">
+                <a16:creationId xmlns:a16="http://schemas.microsoft.com/office/drawing/2014/main" id="{4EEBACDC-C716-DB4A-99FE-04212CB82B8F}"/>
+              </a:ext>
+            </a:extLst>
+          </p:cNvPr>
+          <p:cNvPicPr>
+            <a:picLocks noChangeAspect="1"/>
+          </p:cNvPicPr>
+          <p:nvPr/>
+        </p:nvPicPr>
+        <p:blipFill>
+          <a:blip r:embed="rId21"/>
+          <a:stretch>
+            <a:fillRect/>
+          </a:stretch>
+        </p:blipFill>
+        <p:spPr>
+          <a:xfrm>
+            <a:off x="22405467" y="5201811"/>
+            <a:ext cx="1549634" cy="1549634"/>
+          </a:xfrm>
+          <a:prstGeom prst="rect">
+            <a:avLst/>
+          </a:prstGeom>
+        </p:spPr>
+      </p:pic>
+      <p:pic>
+        <p:nvPicPr>
+          <p:cNvPr id="1044" name="Picture 1043">
+            <a:extLst>
+              <a:ext uri="{FF2B5EF4-FFF2-40B4-BE49-F238E27FC236}">
+                <a16:creationId xmlns:a16="http://schemas.microsoft.com/office/drawing/2014/main" id="{B6C5E788-1C5F-404C-BC8F-929F49158E56}"/>
+              </a:ext>
+            </a:extLst>
+          </p:cNvPr>
+          <p:cNvPicPr>
+            <a:picLocks noChangeAspect="1"/>
+          </p:cNvPicPr>
+          <p:nvPr/>
+        </p:nvPicPr>
+        <p:blipFill>
+          <a:blip r:embed="rId22"/>
+          <a:stretch>
+            <a:fillRect/>
+          </a:stretch>
+        </p:blipFill>
+        <p:spPr>
+          <a:xfrm>
+            <a:off x="24131585" y="5181275"/>
+            <a:ext cx="1570170" cy="1570170"/>
+          </a:xfrm>
+          <a:prstGeom prst="rect">
+            <a:avLst/>
+          </a:prstGeom>
+        </p:spPr>
+      </p:pic>
+      <p:pic>
+        <p:nvPicPr>
+          <p:cNvPr id="1050" name="Picture 1049">
+            <a:extLst>
+              <a:ext uri="{FF2B5EF4-FFF2-40B4-BE49-F238E27FC236}">
+                <a16:creationId xmlns:a16="http://schemas.microsoft.com/office/drawing/2014/main" id="{26A8A5E0-6A3A-4546-BCFC-0E4E835CAD00}"/>
+              </a:ext>
+            </a:extLst>
+          </p:cNvPr>
+          <p:cNvPicPr>
+            <a:picLocks noChangeAspect="1"/>
+          </p:cNvPicPr>
+          <p:nvPr/>
+        </p:nvPicPr>
+        <p:blipFill>
+          <a:blip r:embed="rId23"/>
+          <a:stretch>
+            <a:fillRect/>
+          </a:stretch>
+        </p:blipFill>
+        <p:spPr>
+          <a:xfrm>
+            <a:off x="25870601" y="5181275"/>
+            <a:ext cx="1592171" cy="1592171"/>
+          </a:xfrm>
+          <a:prstGeom prst="rect">
+            <a:avLst/>
+          </a:prstGeom>
+        </p:spPr>
+      </p:pic>
+      <p:pic>
+        <p:nvPicPr>
+          <p:cNvPr id="1052" name="Picture 1051">
+            <a:extLst>
+              <a:ext uri="{FF2B5EF4-FFF2-40B4-BE49-F238E27FC236}">
+                <a16:creationId xmlns:a16="http://schemas.microsoft.com/office/drawing/2014/main" id="{E9A79168-2CE3-7142-9D61-FCEA8CC83309}"/>
+              </a:ext>
+            </a:extLst>
+          </p:cNvPr>
+          <p:cNvPicPr>
+            <a:picLocks noChangeAspect="1"/>
+          </p:cNvPicPr>
+          <p:nvPr/>
+        </p:nvPicPr>
+        <p:blipFill>
+          <a:blip r:embed="rId24"/>
+          <a:stretch>
+            <a:fillRect/>
+          </a:stretch>
+        </p:blipFill>
+        <p:spPr>
+          <a:xfrm>
+            <a:off x="27628852" y="5181274"/>
+            <a:ext cx="1528806" cy="1592171"/>
+          </a:xfrm>
+          <a:prstGeom prst="rect">
+            <a:avLst/>
+          </a:prstGeom>
+        </p:spPr>
+      </p:pic>
+      <p:pic>
+        <p:nvPicPr>
+          <p:cNvPr id="1054" name="Picture 1053">
+            <a:extLst>
+              <a:ext uri="{FF2B5EF4-FFF2-40B4-BE49-F238E27FC236}">
+                <a16:creationId xmlns:a16="http://schemas.microsoft.com/office/drawing/2014/main" id="{ACF829D5-FDC9-2F4A-A4ED-EE520ABC8B9B}"/>
+              </a:ext>
+            </a:extLst>
+          </p:cNvPr>
+          <p:cNvPicPr>
+            <a:picLocks noChangeAspect="1"/>
+          </p:cNvPicPr>
+          <p:nvPr/>
+        </p:nvPicPr>
+        <p:blipFill>
+          <a:blip r:embed="rId25"/>
+          <a:stretch>
+            <a:fillRect/>
+          </a:stretch>
+        </p:blipFill>
+        <p:spPr>
+          <a:xfrm>
+            <a:off x="29388072" y="5229769"/>
+            <a:ext cx="1516737" cy="1516737"/>
+          </a:xfrm>
+          <a:prstGeom prst="rect">
+            <a:avLst/>
+          </a:prstGeom>
+        </p:spPr>
+      </p:pic>
+      <p:pic>
+        <p:nvPicPr>
+          <p:cNvPr id="1056" name="Picture 1055">
+            <a:extLst>
+              <a:ext uri="{FF2B5EF4-FFF2-40B4-BE49-F238E27FC236}">
+                <a16:creationId xmlns:a16="http://schemas.microsoft.com/office/drawing/2014/main" id="{C07783FD-402D-7C4B-BC05-53F0F5CE9DD2}"/>
+              </a:ext>
+            </a:extLst>
+          </p:cNvPr>
+          <p:cNvPicPr>
+            <a:picLocks noChangeAspect="1"/>
+          </p:cNvPicPr>
+          <p:nvPr/>
+        </p:nvPicPr>
+        <p:blipFill>
+          <a:blip r:embed="rId26"/>
+          <a:stretch>
+            <a:fillRect/>
+          </a:stretch>
+        </p:blipFill>
+        <p:spPr>
+          <a:xfrm>
+            <a:off x="31113666" y="5230370"/>
+            <a:ext cx="1516136" cy="1516136"/>
+          </a:xfrm>
+          <a:prstGeom prst="rect">
+            <a:avLst/>
+          </a:prstGeom>
+        </p:spPr>
+      </p:pic>
+      <p:sp>
+        <p:nvSpPr>
+          <p:cNvPr id="1057" name="Rectangle 1056">
+            <a:extLst>
+              <a:ext uri="{FF2B5EF4-FFF2-40B4-BE49-F238E27FC236}">
+                <a16:creationId xmlns:a16="http://schemas.microsoft.com/office/drawing/2014/main" id="{1F4FEE01-12B7-2441-B7EF-C14E80AAB4D9}"/>
+              </a:ext>
+            </a:extLst>
+          </p:cNvPr>
+          <p:cNvSpPr/>
+          <p:nvPr/>
+        </p:nvSpPr>
+        <p:spPr>
+          <a:xfrm>
+            <a:off x="26194620" y="6658778"/>
+            <a:ext cx="2766719" cy="461665"/>
+          </a:xfrm>
+          <a:prstGeom prst="rect">
+            <a:avLst/>
+          </a:prstGeom>
+        </p:spPr>
+        <p:txBody>
+          <a:bodyPr wrap="none">
+            <a:spAutoFit/>
+          </a:bodyPr>
+          <a:lstStyle/>
+          <a:p>
+            <a:r>
+              <a:rPr lang="zh-Hans" altLang="en-US" sz="2400" i="1" dirty="0">
+                <a:solidFill>
+                  <a:srgbClr val="8C8C83"/>
+                </a:solidFill>
+                <a:cs typeface="Arial"/>
+              </a:rPr>
+              <a:t> </a:t>
+            </a:r>
+            <a:r>
+              <a:rPr lang="en-US" sz="2400" i="1" dirty="0">
+                <a:solidFill>
+                  <a:srgbClr val="8C8C83"/>
+                </a:solidFill>
+                <a:cs typeface="Arial"/>
+              </a:rPr>
+              <a:t>Figure </a:t>
+            </a:r>
+            <a:r>
+              <a:rPr lang="en-US" altLang="zh-Hans" sz="2400" i="1" dirty="0">
+                <a:solidFill>
+                  <a:srgbClr val="8C8C83"/>
+                </a:solidFill>
+                <a:cs typeface="Arial"/>
+              </a:rPr>
+              <a:t>6</a:t>
+            </a:r>
+            <a:r>
+              <a:rPr lang="en-US" sz="2400" i="1" dirty="0">
+                <a:solidFill>
+                  <a:srgbClr val="8C8C83"/>
+                </a:solidFill>
+                <a:cs typeface="Arial"/>
+              </a:rPr>
+              <a:t>.</a:t>
+            </a:r>
+            <a:r>
+              <a:rPr lang="zh-Hans" altLang="en-US" sz="2400" i="1" dirty="0">
+                <a:solidFill>
+                  <a:srgbClr val="8C8C83"/>
+                </a:solidFill>
+                <a:cs typeface="Arial"/>
+              </a:rPr>
+              <a:t> </a:t>
+            </a:r>
+            <a:r>
+              <a:rPr lang="en-US" altLang="zh-Hans" sz="2400" i="1" dirty="0">
+                <a:solidFill>
+                  <a:srgbClr val="8C8C83"/>
+                </a:solidFill>
+                <a:cs typeface="Arial"/>
+              </a:rPr>
+              <a:t>test</a:t>
+            </a:r>
+            <a:r>
+              <a:rPr lang="zh-Hans" altLang="en-US" sz="2400" i="1" dirty="0">
+                <a:solidFill>
+                  <a:srgbClr val="8C8C83"/>
+                </a:solidFill>
+                <a:cs typeface="Arial"/>
+              </a:rPr>
+              <a:t> </a:t>
+            </a:r>
+            <a:r>
+              <a:rPr lang="en-US" altLang="zh-Hans" sz="2400" i="1" dirty="0">
+                <a:solidFill>
+                  <a:srgbClr val="8C8C83"/>
+                </a:solidFill>
+                <a:cs typeface="Arial"/>
+              </a:rPr>
+              <a:t>results</a:t>
+            </a:r>
+            <a:endParaRPr lang="en-US" sz="2400" dirty="0"/>
+          </a:p>
+        </p:txBody>
+      </p:sp>
+      <p:pic>
+        <p:nvPicPr>
+          <p:cNvPr id="1059" name="Picture 1058">
+            <a:extLst>
+              <a:ext uri="{FF2B5EF4-FFF2-40B4-BE49-F238E27FC236}">
+                <a16:creationId xmlns:a16="http://schemas.microsoft.com/office/drawing/2014/main" id="{D4B9BCAF-75C0-A145-A59C-641D469FA02C}"/>
+              </a:ext>
+            </a:extLst>
+          </p:cNvPr>
+          <p:cNvPicPr>
+            <a:picLocks noChangeAspect="1"/>
+          </p:cNvPicPr>
+          <p:nvPr/>
+        </p:nvPicPr>
+        <p:blipFill>
+          <a:blip r:embed="rId27"/>
+          <a:stretch>
+            <a:fillRect/>
+          </a:stretch>
+        </p:blipFill>
+        <p:spPr>
+          <a:xfrm>
+            <a:off x="28904444" y="9480564"/>
+            <a:ext cx="1520866" cy="1481713"/>
+          </a:xfrm>
+          <a:prstGeom prst="rect">
+            <a:avLst/>
+          </a:prstGeom>
+        </p:spPr>
+      </p:pic>
+      <p:pic>
+        <p:nvPicPr>
+          <p:cNvPr id="1061" name="Picture 1060">
+            <a:extLst>
+              <a:ext uri="{FF2B5EF4-FFF2-40B4-BE49-F238E27FC236}">
+                <a16:creationId xmlns:a16="http://schemas.microsoft.com/office/drawing/2014/main" id="{45DD3585-7CB0-104E-A3B0-6EA1F2A927FF}"/>
+              </a:ext>
+            </a:extLst>
+          </p:cNvPr>
+          <p:cNvPicPr>
+            <a:picLocks noChangeAspect="1"/>
+          </p:cNvPicPr>
+          <p:nvPr/>
+        </p:nvPicPr>
+        <p:blipFill>
+          <a:blip r:embed="rId28"/>
+          <a:stretch>
+            <a:fillRect/>
+          </a:stretch>
+        </p:blipFill>
+        <p:spPr>
+          <a:xfrm>
+            <a:off x="30902367" y="9480564"/>
+            <a:ext cx="1481713" cy="1481713"/>
+          </a:xfrm>
+          <a:prstGeom prst="rect">
+            <a:avLst/>
+          </a:prstGeom>
+        </p:spPr>
+      </p:pic>
     </p:spTree>
     <p:extLst>
       <p:ext uri="{BB962C8B-B14F-4D97-AF65-F5344CB8AC3E}">

</xml_diff>